<commit_message>
update UserGuide and DeveloperGuide
</commit_message>
<xml_diff>
--- a/docs/diagrams/HighLevelSequenceDiagrams.pptx
+++ b/docs/diagrams/HighLevelSequenceDiagrams.pptx
@@ -8,7 +8,7 @@
     <p:notesMasterId r:id="rId3"/>
   </p:notesMasterIdLst>
   <p:sldIdLst>
-    <p:sldId id="266" r:id="rId2"/>
+    <p:sldId id="267" r:id="rId2"/>
   </p:sldIdLst>
   <p:sldSz cx="9144000" cy="6858000" type="screen4x3"/>
   <p:notesSz cx="6858000" cy="9144000"/>
@@ -107,6 +107,22 @@
       </a:defRPr>
     </a:lvl9pPr>
   </p:defaultTextStyle>
+  <p:extLst>
+    <p:ext uri="{EFAFB233-063F-42B5-8137-9DF3F51BA10A}">
+      <p15:sldGuideLst xmlns:p15="http://schemas.microsoft.com/office/powerpoint/2012/main">
+        <p15:guide id="1" orient="horz" pos="1488">
+          <p15:clr>
+            <a:srgbClr val="A4A3A4"/>
+          </p15:clr>
+        </p15:guide>
+        <p15:guide id="2" pos="2880">
+          <p15:clr>
+            <a:srgbClr val="A4A3A4"/>
+          </p15:clr>
+        </p15:guide>
+      </p15:sldGuideLst>
+    </p:ext>
+  </p:extLst>
 </p:presentation>
 </file>
 
@@ -192,7 +208,7 @@
           <a:p>
             <a:fld id="{F5CC4B3F-88C1-4FFA-B1B6-F41C21DC6924}" type="datetimeFigureOut">
               <a:rPr lang="en-US" smtClean="0"/>
-              <a:t>10/16/2016</a:t>
+              <a:t>10/31/18</a:t>
             </a:fld>
             <a:endParaRPr lang="en-US"/>
           </a:p>
@@ -256,38 +272,37 @@
           <a:p>
             <a:pPr lvl="0"/>
             <a:r>
-              <a:rPr lang="en-US" smtClean="0"/>
+              <a:rPr lang="en-US"/>
               <a:t>Click to edit Master text styles</a:t>
             </a:r>
           </a:p>
           <a:p>
             <a:pPr lvl="1"/>
             <a:r>
-              <a:rPr lang="en-US" smtClean="0"/>
+              <a:rPr lang="en-US"/>
               <a:t>Second level</a:t>
             </a:r>
           </a:p>
           <a:p>
             <a:pPr lvl="2"/>
             <a:r>
-              <a:rPr lang="en-US" smtClean="0"/>
+              <a:rPr lang="en-US"/>
               <a:t>Third level</a:t>
             </a:r>
           </a:p>
           <a:p>
             <a:pPr lvl="3"/>
             <a:r>
-              <a:rPr lang="en-US" smtClean="0"/>
+              <a:rPr lang="en-US"/>
               <a:t>Fourth level</a:t>
             </a:r>
           </a:p>
           <a:p>
             <a:pPr lvl="4"/>
             <a:r>
-              <a:rPr lang="en-US" smtClean="0"/>
+              <a:rPr lang="en-US"/>
               <a:t>Fifth level</a:t>
             </a:r>
-            <a:endParaRPr lang="en-US"/>
           </a:p>
         </p:txBody>
       </p:sp>
@@ -498,10 +513,9 @@
           <a:lstStyle/>
           <a:p>
             <a:r>
-              <a:rPr lang="en-US" smtClean="0"/>
+              <a:rPr lang="en-US"/>
               <a:t>Click to edit Master title style</a:t>
             </a:r>
-            <a:endParaRPr lang="en-US"/>
           </a:p>
         </p:txBody>
       </p:sp>
@@ -617,10 +631,9 @@
           </a:lstStyle>
           <a:p>
             <a:r>
-              <a:rPr lang="en-US" smtClean="0"/>
+              <a:rPr lang="en-US"/>
               <a:t>Click to edit Master subtitle style</a:t>
             </a:r>
-            <a:endParaRPr lang="en-US"/>
           </a:p>
         </p:txBody>
       </p:sp>
@@ -641,7 +654,7 @@
           <a:p>
             <a:fld id="{78C97017-6FC3-485B-9764-EAC9E56C1D49}" type="datetimeFigureOut">
               <a:rPr lang="en-US" smtClean="0"/>
-              <a:t>10/16/2016</a:t>
+              <a:t>10/31/18</a:t>
             </a:fld>
             <a:endParaRPr lang="en-US"/>
           </a:p>
@@ -735,10 +748,9 @@
           <a:lstStyle/>
           <a:p>
             <a:r>
-              <a:rPr lang="en-US" smtClean="0"/>
+              <a:rPr lang="en-US"/>
               <a:t>Click to edit Master title style</a:t>
             </a:r>
-            <a:endParaRPr lang="en-US"/>
           </a:p>
         </p:txBody>
       </p:sp>
@@ -759,38 +771,37 @@
           <a:p>
             <a:pPr lvl="0"/>
             <a:r>
-              <a:rPr lang="en-US" smtClean="0"/>
+              <a:rPr lang="en-US"/>
               <a:t>Click to edit Master text styles</a:t>
             </a:r>
           </a:p>
           <a:p>
             <a:pPr lvl="1"/>
             <a:r>
-              <a:rPr lang="en-US" smtClean="0"/>
+              <a:rPr lang="en-US"/>
               <a:t>Second level</a:t>
             </a:r>
           </a:p>
           <a:p>
             <a:pPr lvl="2"/>
             <a:r>
-              <a:rPr lang="en-US" smtClean="0"/>
+              <a:rPr lang="en-US"/>
               <a:t>Third level</a:t>
             </a:r>
           </a:p>
           <a:p>
             <a:pPr lvl="3"/>
             <a:r>
-              <a:rPr lang="en-US" smtClean="0"/>
+              <a:rPr lang="en-US"/>
               <a:t>Fourth level</a:t>
             </a:r>
           </a:p>
           <a:p>
             <a:pPr lvl="4"/>
             <a:r>
-              <a:rPr lang="en-US" smtClean="0"/>
+              <a:rPr lang="en-US"/>
               <a:t>Fifth level</a:t>
             </a:r>
-            <a:endParaRPr lang="en-US"/>
           </a:p>
         </p:txBody>
       </p:sp>
@@ -811,7 +822,7 @@
           <a:p>
             <a:fld id="{78C97017-6FC3-485B-9764-EAC9E56C1D49}" type="datetimeFigureOut">
               <a:rPr lang="en-US" smtClean="0"/>
-              <a:t>10/16/2016</a:t>
+              <a:t>10/31/18</a:t>
             </a:fld>
             <a:endParaRPr lang="en-US"/>
           </a:p>
@@ -910,10 +921,9 @@
           <a:lstStyle/>
           <a:p>
             <a:r>
-              <a:rPr lang="en-US" smtClean="0"/>
+              <a:rPr lang="en-US"/>
               <a:t>Click to edit Master title style</a:t>
             </a:r>
-            <a:endParaRPr lang="en-US"/>
           </a:p>
         </p:txBody>
       </p:sp>
@@ -939,38 +949,37 @@
           <a:p>
             <a:pPr lvl="0"/>
             <a:r>
-              <a:rPr lang="en-US" smtClean="0"/>
+              <a:rPr lang="en-US"/>
               <a:t>Click to edit Master text styles</a:t>
             </a:r>
           </a:p>
           <a:p>
             <a:pPr lvl="1"/>
             <a:r>
-              <a:rPr lang="en-US" smtClean="0"/>
+              <a:rPr lang="en-US"/>
               <a:t>Second level</a:t>
             </a:r>
           </a:p>
           <a:p>
             <a:pPr lvl="2"/>
             <a:r>
-              <a:rPr lang="en-US" smtClean="0"/>
+              <a:rPr lang="en-US"/>
               <a:t>Third level</a:t>
             </a:r>
           </a:p>
           <a:p>
             <a:pPr lvl="3"/>
             <a:r>
-              <a:rPr lang="en-US" smtClean="0"/>
+              <a:rPr lang="en-US"/>
               <a:t>Fourth level</a:t>
             </a:r>
           </a:p>
           <a:p>
             <a:pPr lvl="4"/>
             <a:r>
-              <a:rPr lang="en-US" smtClean="0"/>
+              <a:rPr lang="en-US"/>
               <a:t>Fifth level</a:t>
             </a:r>
-            <a:endParaRPr lang="en-US"/>
           </a:p>
         </p:txBody>
       </p:sp>
@@ -991,7 +1000,7 @@
           <a:p>
             <a:fld id="{78C97017-6FC3-485B-9764-EAC9E56C1D49}" type="datetimeFigureOut">
               <a:rPr lang="en-US" smtClean="0"/>
-              <a:t>10/16/2016</a:t>
+              <a:t>10/31/18</a:t>
             </a:fld>
             <a:endParaRPr lang="en-US"/>
           </a:p>
@@ -1085,10 +1094,9 @@
           <a:lstStyle/>
           <a:p>
             <a:r>
-              <a:rPr lang="en-US" smtClean="0"/>
+              <a:rPr lang="en-US"/>
               <a:t>Click to edit Master title style</a:t>
             </a:r>
-            <a:endParaRPr lang="en-US"/>
           </a:p>
         </p:txBody>
       </p:sp>
@@ -1109,38 +1117,37 @@
           <a:p>
             <a:pPr lvl="0"/>
             <a:r>
-              <a:rPr lang="en-US" smtClean="0"/>
+              <a:rPr lang="en-US"/>
               <a:t>Click to edit Master text styles</a:t>
             </a:r>
           </a:p>
           <a:p>
             <a:pPr lvl="1"/>
             <a:r>
-              <a:rPr lang="en-US" smtClean="0"/>
+              <a:rPr lang="en-US"/>
               <a:t>Second level</a:t>
             </a:r>
           </a:p>
           <a:p>
             <a:pPr lvl="2"/>
             <a:r>
-              <a:rPr lang="en-US" smtClean="0"/>
+              <a:rPr lang="en-US"/>
               <a:t>Third level</a:t>
             </a:r>
           </a:p>
           <a:p>
             <a:pPr lvl="3"/>
             <a:r>
-              <a:rPr lang="en-US" smtClean="0"/>
+              <a:rPr lang="en-US"/>
               <a:t>Fourth level</a:t>
             </a:r>
           </a:p>
           <a:p>
             <a:pPr lvl="4"/>
             <a:r>
-              <a:rPr lang="en-US" smtClean="0"/>
+              <a:rPr lang="en-US"/>
               <a:t>Fifth level</a:t>
             </a:r>
-            <a:endParaRPr lang="en-US"/>
           </a:p>
         </p:txBody>
       </p:sp>
@@ -1161,7 +1168,7 @@
           <a:p>
             <a:fld id="{78C97017-6FC3-485B-9764-EAC9E56C1D49}" type="datetimeFigureOut">
               <a:rPr lang="en-US" smtClean="0"/>
-              <a:t>10/16/2016</a:t>
+              <a:t>10/31/18</a:t>
             </a:fld>
             <a:endParaRPr lang="en-US"/>
           </a:p>
@@ -1264,10 +1271,9 @@
           </a:lstStyle>
           <a:p>
             <a:r>
-              <a:rPr lang="en-US" smtClean="0"/>
+              <a:rPr lang="en-US"/>
               <a:t>Click to edit Master title style</a:t>
             </a:r>
-            <a:endParaRPr lang="en-US"/>
           </a:p>
         </p:txBody>
       </p:sp>
@@ -1384,7 +1390,7 @@
           <a:p>
             <a:pPr lvl="0"/>
             <a:r>
-              <a:rPr lang="en-US" smtClean="0"/>
+              <a:rPr lang="en-US"/>
               <a:t>Click to edit Master text styles</a:t>
             </a:r>
           </a:p>
@@ -1407,7 +1413,7 @@
           <a:p>
             <a:fld id="{78C97017-6FC3-485B-9764-EAC9E56C1D49}" type="datetimeFigureOut">
               <a:rPr lang="en-US" smtClean="0"/>
-              <a:t>10/16/2016</a:t>
+              <a:t>10/31/18</a:t>
             </a:fld>
             <a:endParaRPr lang="en-US"/>
           </a:p>
@@ -1501,10 +1507,9 @@
           <a:lstStyle/>
           <a:p>
             <a:r>
-              <a:rPr lang="en-US" smtClean="0"/>
+              <a:rPr lang="en-US"/>
               <a:t>Click to edit Master title style</a:t>
             </a:r>
-            <a:endParaRPr lang="en-US"/>
           </a:p>
         </p:txBody>
       </p:sp>
@@ -1558,38 +1563,37 @@
           <a:p>
             <a:pPr lvl="0"/>
             <a:r>
-              <a:rPr lang="en-US" smtClean="0"/>
+              <a:rPr lang="en-US"/>
               <a:t>Click to edit Master text styles</a:t>
             </a:r>
           </a:p>
           <a:p>
             <a:pPr lvl="1"/>
             <a:r>
-              <a:rPr lang="en-US" smtClean="0"/>
+              <a:rPr lang="en-US"/>
               <a:t>Second level</a:t>
             </a:r>
           </a:p>
           <a:p>
             <a:pPr lvl="2"/>
             <a:r>
-              <a:rPr lang="en-US" smtClean="0"/>
+              <a:rPr lang="en-US"/>
               <a:t>Third level</a:t>
             </a:r>
           </a:p>
           <a:p>
             <a:pPr lvl="3"/>
             <a:r>
-              <a:rPr lang="en-US" smtClean="0"/>
+              <a:rPr lang="en-US"/>
               <a:t>Fourth level</a:t>
             </a:r>
           </a:p>
           <a:p>
             <a:pPr lvl="4"/>
             <a:r>
-              <a:rPr lang="en-US" smtClean="0"/>
+              <a:rPr lang="en-US"/>
               <a:t>Fifth level</a:t>
             </a:r>
-            <a:endParaRPr lang="en-US"/>
           </a:p>
         </p:txBody>
       </p:sp>
@@ -1643,38 +1647,37 @@
           <a:p>
             <a:pPr lvl="0"/>
             <a:r>
-              <a:rPr lang="en-US" smtClean="0"/>
+              <a:rPr lang="en-US"/>
               <a:t>Click to edit Master text styles</a:t>
             </a:r>
           </a:p>
           <a:p>
             <a:pPr lvl="1"/>
             <a:r>
-              <a:rPr lang="en-US" smtClean="0"/>
+              <a:rPr lang="en-US"/>
               <a:t>Second level</a:t>
             </a:r>
           </a:p>
           <a:p>
             <a:pPr lvl="2"/>
             <a:r>
-              <a:rPr lang="en-US" smtClean="0"/>
+              <a:rPr lang="en-US"/>
               <a:t>Third level</a:t>
             </a:r>
           </a:p>
           <a:p>
             <a:pPr lvl="3"/>
             <a:r>
-              <a:rPr lang="en-US" smtClean="0"/>
+              <a:rPr lang="en-US"/>
               <a:t>Fourth level</a:t>
             </a:r>
           </a:p>
           <a:p>
             <a:pPr lvl="4"/>
             <a:r>
-              <a:rPr lang="en-US" smtClean="0"/>
+              <a:rPr lang="en-US"/>
               <a:t>Fifth level</a:t>
             </a:r>
-            <a:endParaRPr lang="en-US"/>
           </a:p>
         </p:txBody>
       </p:sp>
@@ -1695,7 +1698,7 @@
           <a:p>
             <a:fld id="{78C97017-6FC3-485B-9764-EAC9E56C1D49}" type="datetimeFigureOut">
               <a:rPr lang="en-US" smtClean="0"/>
-              <a:t>10/16/2016</a:t>
+              <a:t>10/31/18</a:t>
             </a:fld>
             <a:endParaRPr lang="en-US"/>
           </a:p>
@@ -1793,10 +1796,9 @@
           </a:lstStyle>
           <a:p>
             <a:r>
-              <a:rPr lang="en-US" smtClean="0"/>
+              <a:rPr lang="en-US"/>
               <a:t>Click to edit Master title style</a:t>
             </a:r>
-            <a:endParaRPr lang="en-US"/>
           </a:p>
         </p:txBody>
       </p:sp>
@@ -1859,7 +1861,7 @@
           <a:p>
             <a:pPr lvl="0"/>
             <a:r>
-              <a:rPr lang="en-US" smtClean="0"/>
+              <a:rPr lang="en-US"/>
               <a:t>Click to edit Master text styles</a:t>
             </a:r>
           </a:p>
@@ -1915,38 +1917,37 @@
           <a:p>
             <a:pPr lvl="0"/>
             <a:r>
-              <a:rPr lang="en-US" smtClean="0"/>
+              <a:rPr lang="en-US"/>
               <a:t>Click to edit Master text styles</a:t>
             </a:r>
           </a:p>
           <a:p>
             <a:pPr lvl="1"/>
             <a:r>
-              <a:rPr lang="en-US" smtClean="0"/>
+              <a:rPr lang="en-US"/>
               <a:t>Second level</a:t>
             </a:r>
           </a:p>
           <a:p>
             <a:pPr lvl="2"/>
             <a:r>
-              <a:rPr lang="en-US" smtClean="0"/>
+              <a:rPr lang="en-US"/>
               <a:t>Third level</a:t>
             </a:r>
           </a:p>
           <a:p>
             <a:pPr lvl="3"/>
             <a:r>
-              <a:rPr lang="en-US" smtClean="0"/>
+              <a:rPr lang="en-US"/>
               <a:t>Fourth level</a:t>
             </a:r>
           </a:p>
           <a:p>
             <a:pPr lvl="4"/>
             <a:r>
-              <a:rPr lang="en-US" smtClean="0"/>
+              <a:rPr lang="en-US"/>
               <a:t>Fifth level</a:t>
             </a:r>
-            <a:endParaRPr lang="en-US"/>
           </a:p>
         </p:txBody>
       </p:sp>
@@ -2009,7 +2010,7 @@
           <a:p>
             <a:pPr lvl="0"/>
             <a:r>
-              <a:rPr lang="en-US" smtClean="0"/>
+              <a:rPr lang="en-US"/>
               <a:t>Click to edit Master text styles</a:t>
             </a:r>
           </a:p>
@@ -2065,38 +2066,37 @@
           <a:p>
             <a:pPr lvl="0"/>
             <a:r>
-              <a:rPr lang="en-US" smtClean="0"/>
+              <a:rPr lang="en-US"/>
               <a:t>Click to edit Master text styles</a:t>
             </a:r>
           </a:p>
           <a:p>
             <a:pPr lvl="1"/>
             <a:r>
-              <a:rPr lang="en-US" smtClean="0"/>
+              <a:rPr lang="en-US"/>
               <a:t>Second level</a:t>
             </a:r>
           </a:p>
           <a:p>
             <a:pPr lvl="2"/>
             <a:r>
-              <a:rPr lang="en-US" smtClean="0"/>
+              <a:rPr lang="en-US"/>
               <a:t>Third level</a:t>
             </a:r>
           </a:p>
           <a:p>
             <a:pPr lvl="3"/>
             <a:r>
-              <a:rPr lang="en-US" smtClean="0"/>
+              <a:rPr lang="en-US"/>
               <a:t>Fourth level</a:t>
             </a:r>
           </a:p>
           <a:p>
             <a:pPr lvl="4"/>
             <a:r>
-              <a:rPr lang="en-US" smtClean="0"/>
+              <a:rPr lang="en-US"/>
               <a:t>Fifth level</a:t>
             </a:r>
-            <a:endParaRPr lang="en-US"/>
           </a:p>
         </p:txBody>
       </p:sp>
@@ -2117,7 +2117,7 @@
           <a:p>
             <a:fld id="{78C97017-6FC3-485B-9764-EAC9E56C1D49}" type="datetimeFigureOut">
               <a:rPr lang="en-US" smtClean="0"/>
-              <a:t>10/16/2016</a:t>
+              <a:t>10/31/18</a:t>
             </a:fld>
             <a:endParaRPr lang="en-US"/>
           </a:p>
@@ -2211,10 +2211,9 @@
           <a:lstStyle/>
           <a:p>
             <a:r>
-              <a:rPr lang="en-US" smtClean="0"/>
+              <a:rPr lang="en-US"/>
               <a:t>Click to edit Master title style</a:t>
             </a:r>
-            <a:endParaRPr lang="en-US"/>
           </a:p>
         </p:txBody>
       </p:sp>
@@ -2235,7 +2234,7 @@
           <a:p>
             <a:fld id="{78C97017-6FC3-485B-9764-EAC9E56C1D49}" type="datetimeFigureOut">
               <a:rPr lang="en-US" smtClean="0"/>
-              <a:t>10/16/2016</a:t>
+              <a:t>10/31/18</a:t>
             </a:fld>
             <a:endParaRPr lang="en-US"/>
           </a:p>
@@ -2330,7 +2329,7 @@
           <a:p>
             <a:fld id="{78C97017-6FC3-485B-9764-EAC9E56C1D49}" type="datetimeFigureOut">
               <a:rPr lang="en-US" smtClean="0"/>
-              <a:t>10/16/2016</a:t>
+              <a:t>10/31/18</a:t>
             </a:fld>
             <a:endParaRPr lang="en-US"/>
           </a:p>
@@ -2433,10 +2432,9 @@
           </a:lstStyle>
           <a:p>
             <a:r>
-              <a:rPr lang="en-US" smtClean="0"/>
+              <a:rPr lang="en-US"/>
               <a:t>Click to edit Master title style</a:t>
             </a:r>
-            <a:endParaRPr lang="en-US"/>
           </a:p>
         </p:txBody>
       </p:sp>
@@ -2490,38 +2488,37 @@
           <a:p>
             <a:pPr lvl="0"/>
             <a:r>
-              <a:rPr lang="en-US" smtClean="0"/>
+              <a:rPr lang="en-US"/>
               <a:t>Click to edit Master text styles</a:t>
             </a:r>
           </a:p>
           <a:p>
             <a:pPr lvl="1"/>
             <a:r>
-              <a:rPr lang="en-US" smtClean="0"/>
+              <a:rPr lang="en-US"/>
               <a:t>Second level</a:t>
             </a:r>
           </a:p>
           <a:p>
             <a:pPr lvl="2"/>
             <a:r>
-              <a:rPr lang="en-US" smtClean="0"/>
+              <a:rPr lang="en-US"/>
               <a:t>Third level</a:t>
             </a:r>
           </a:p>
           <a:p>
             <a:pPr lvl="3"/>
             <a:r>
-              <a:rPr lang="en-US" smtClean="0"/>
+              <a:rPr lang="en-US"/>
               <a:t>Fourth level</a:t>
             </a:r>
           </a:p>
           <a:p>
             <a:pPr lvl="4"/>
             <a:r>
-              <a:rPr lang="en-US" smtClean="0"/>
+              <a:rPr lang="en-US"/>
               <a:t>Fifth level</a:t>
             </a:r>
-            <a:endParaRPr lang="en-US"/>
           </a:p>
         </p:txBody>
       </p:sp>
@@ -2584,7 +2581,7 @@
           <a:p>
             <a:pPr lvl="0"/>
             <a:r>
-              <a:rPr lang="en-US" smtClean="0"/>
+              <a:rPr lang="en-US"/>
               <a:t>Click to edit Master text styles</a:t>
             </a:r>
           </a:p>
@@ -2607,7 +2604,7 @@
           <a:p>
             <a:fld id="{78C97017-6FC3-485B-9764-EAC9E56C1D49}" type="datetimeFigureOut">
               <a:rPr lang="en-US" smtClean="0"/>
-              <a:t>10/16/2016</a:t>
+              <a:t>10/31/18</a:t>
             </a:fld>
             <a:endParaRPr lang="en-US"/>
           </a:p>
@@ -2710,10 +2707,9 @@
           </a:lstStyle>
           <a:p>
             <a:r>
-              <a:rPr lang="en-US" smtClean="0"/>
+              <a:rPr lang="en-US"/>
               <a:t>Click to edit Master title style</a:t>
             </a:r>
-            <a:endParaRPr lang="en-US"/>
           </a:p>
         </p:txBody>
       </p:sp>
@@ -2837,7 +2833,7 @@
           <a:p>
             <a:pPr lvl="0"/>
             <a:r>
-              <a:rPr lang="en-US" smtClean="0"/>
+              <a:rPr lang="en-US"/>
               <a:t>Click to edit Master text styles</a:t>
             </a:r>
           </a:p>
@@ -2860,7 +2856,7 @@
           <a:p>
             <a:fld id="{78C97017-6FC3-485B-9764-EAC9E56C1D49}" type="datetimeFigureOut">
               <a:rPr lang="en-US" smtClean="0"/>
-              <a:t>10/16/2016</a:t>
+              <a:t>10/31/18</a:t>
             </a:fld>
             <a:endParaRPr lang="en-US"/>
           </a:p>
@@ -2969,10 +2965,9 @@
           <a:lstStyle/>
           <a:p>
             <a:r>
-              <a:rPr lang="en-US" smtClean="0"/>
+              <a:rPr lang="en-US"/>
               <a:t>Click to edit Master title style</a:t>
             </a:r>
-            <a:endParaRPr lang="en-US"/>
           </a:p>
         </p:txBody>
       </p:sp>
@@ -3003,38 +2998,37 @@
           <a:p>
             <a:pPr lvl="0"/>
             <a:r>
-              <a:rPr lang="en-US" smtClean="0"/>
+              <a:rPr lang="en-US"/>
               <a:t>Click to edit Master text styles</a:t>
             </a:r>
           </a:p>
           <a:p>
             <a:pPr lvl="1"/>
             <a:r>
-              <a:rPr lang="en-US" smtClean="0"/>
+              <a:rPr lang="en-US"/>
               <a:t>Second level</a:t>
             </a:r>
           </a:p>
           <a:p>
             <a:pPr lvl="2"/>
             <a:r>
-              <a:rPr lang="en-US" smtClean="0"/>
+              <a:rPr lang="en-US"/>
               <a:t>Third level</a:t>
             </a:r>
           </a:p>
           <a:p>
             <a:pPr lvl="3"/>
             <a:r>
-              <a:rPr lang="en-US" smtClean="0"/>
+              <a:rPr lang="en-US"/>
               <a:t>Fourth level</a:t>
             </a:r>
           </a:p>
           <a:p>
             <a:pPr lvl="4"/>
             <a:r>
-              <a:rPr lang="en-US" smtClean="0"/>
+              <a:rPr lang="en-US"/>
               <a:t>Fifth level</a:t>
             </a:r>
-            <a:endParaRPr lang="en-US"/>
           </a:p>
         </p:txBody>
       </p:sp>
@@ -3073,7 +3067,7 @@
           <a:p>
             <a:fld id="{78C97017-6FC3-485B-9764-EAC9E56C1D49}" type="datetimeFigureOut">
               <a:rPr lang="en-US" smtClean="0"/>
-              <a:t>10/16/2016</a:t>
+              <a:t>10/31/18</a:t>
             </a:fld>
             <a:endParaRPr lang="en-US"/>
           </a:p>
@@ -3450,25 +3444,34 @@
       </p:grpSpPr>
       <p:sp>
         <p:nvSpPr>
-          <p:cNvPr id="2" name="Rectangle 62"/>
+          <p:cNvPr id="64" name="Rectangle 65">
+            <a:extLst>
+              <a:ext uri="{FF2B5EF4-FFF2-40B4-BE49-F238E27FC236}">
+                <a16:creationId xmlns:a16="http://schemas.microsoft.com/office/drawing/2014/main" id="{01EAA103-1E68-CF4A-BC20-E47B8E043351}"/>
+              </a:ext>
+            </a:extLst>
+          </p:cNvPr>
           <p:cNvSpPr/>
           <p:nvPr/>
         </p:nvSpPr>
         <p:spPr>
           <a:xfrm>
-            <a:off x="1111860" y="607926"/>
-            <a:ext cx="1093635" cy="346760"/>
-          </a:xfrm>
-          <a:prstGeom prst="rect">
-            <a:avLst/>
+            <a:off x="1135678" y="181641"/>
+            <a:ext cx="4088461" cy="2653030"/>
+          </a:xfrm>
+          <a:prstGeom prst="roundRect">
+            <a:avLst>
+              <a:gd name="adj" fmla="val 3484"/>
+            </a:avLst>
           </a:prstGeom>
           <a:solidFill>
-            <a:srgbClr val="00B050"/>
+            <a:schemeClr val="accent1">
+              <a:lumMod val="20000"/>
+              <a:lumOff val="80000"/>
+            </a:schemeClr>
           </a:solidFill>
           <a:ln w="19050">
-            <a:solidFill>
-              <a:srgbClr val="00B050"/>
-            </a:solidFill>
+            <a:noFill/>
           </a:ln>
           <a:effectLst/>
         </p:spPr>
@@ -3487,12 +3490,70 @@
           </a:fontRef>
         </p:style>
         <p:txBody>
+          <a:bodyPr rtlCol="0" anchor="t"/>
+          <a:lstStyle/>
+          <a:p>
+            <a:r>
+              <a:rPr lang="en-US" sz="1200" b="1" dirty="0">
+                <a:solidFill>
+                  <a:srgbClr val="0070C0"/>
+                </a:solidFill>
+              </a:rPr>
+              <a:t>Logic</a:t>
+            </a:r>
+            <a:endParaRPr lang="en-SG" sz="1200" b="1" dirty="0">
+              <a:solidFill>
+                <a:srgbClr val="0070C0"/>
+              </a:solidFill>
+            </a:endParaRPr>
+          </a:p>
+        </p:txBody>
+      </p:sp>
+      <p:sp>
+        <p:nvSpPr>
+          <p:cNvPr id="2" name="Rectangle 62"/>
+          <p:cNvSpPr/>
+          <p:nvPr/>
+        </p:nvSpPr>
+        <p:spPr>
+          <a:xfrm>
+            <a:off x="623694" y="751071"/>
+            <a:ext cx="472952" cy="194876"/>
+          </a:xfrm>
+          <a:prstGeom prst="rect">
+            <a:avLst/>
+          </a:prstGeom>
+          <a:solidFill>
+            <a:srgbClr val="00B050"/>
+          </a:solidFill>
+          <a:ln w="19050">
+            <a:solidFill>
+              <a:srgbClr val="00B050"/>
+            </a:solidFill>
+          </a:ln>
+          <a:effectLst/>
+        </p:spPr>
+        <p:style>
+          <a:lnRef idx="1">
+            <a:schemeClr val="accent2"/>
+          </a:lnRef>
+          <a:fillRef idx="2">
+            <a:schemeClr val="accent2"/>
+          </a:fillRef>
+          <a:effectRef idx="1">
+            <a:schemeClr val="accent2"/>
+          </a:effectRef>
+          <a:fontRef idx="minor">
+            <a:schemeClr val="dk1"/>
+          </a:fontRef>
+        </p:style>
+        <p:txBody>
           <a:bodyPr rtlCol="0" anchor="ctr"/>
           <a:lstStyle/>
           <a:p>
             <a:pPr algn="ctr"/>
             <a:r>
-              <a:rPr lang="en-US" sz="1600" dirty="0" smtClean="0">
+              <a:rPr lang="en-US" sz="1600" dirty="0">
                 <a:solidFill>
                   <a:schemeClr val="bg1"/>
                 </a:solidFill>
@@ -3510,13 +3571,15 @@
       <p:cxnSp>
         <p:nvCxnSpPr>
           <p:cNvPr id="5" name="Straight Connector 4"/>
-          <p:cNvCxnSpPr/>
+          <p:cNvCxnSpPr>
+            <a:cxnSpLocks/>
+          </p:cNvCxnSpPr>
           <p:nvPr/>
         </p:nvCxnSpPr>
         <p:spPr>
           <a:xfrm>
-            <a:off x="1658677" y="971597"/>
-            <a:ext cx="0" cy="1723059"/>
+            <a:off x="861965" y="971597"/>
+            <a:ext cx="20251" cy="2000203"/>
           </a:xfrm>
           <a:prstGeom prst="line">
             <a:avLst/>
@@ -3552,8 +3615,8 @@
         </p:nvSpPr>
         <p:spPr>
           <a:xfrm>
-            <a:off x="1586669" y="1322292"/>
-            <a:ext cx="152400" cy="1019910"/>
+            <a:off x="776378" y="1322291"/>
+            <a:ext cx="150766" cy="1397987"/>
           </a:xfrm>
           <a:prstGeom prst="rect">
             <a:avLst/>
@@ -3603,7 +3666,7 @@
         </p:nvGrpSpPr>
         <p:grpSpPr>
           <a:xfrm>
-            <a:off x="152400" y="533400"/>
+            <a:off x="155057" y="575507"/>
             <a:ext cx="324036" cy="573410"/>
             <a:chOff x="3239901" y="4149080"/>
             <a:chExt cx="648072" cy="1146820"/>
@@ -3820,8 +3883,8 @@
         </p:nvSpPr>
         <p:spPr>
           <a:xfrm>
-            <a:off x="3335583" y="611613"/>
-            <a:ext cx="1093635" cy="346760"/>
+            <a:off x="1434371" y="760779"/>
+            <a:ext cx="640254" cy="212243"/>
           </a:xfrm>
           <a:prstGeom prst="rect">
             <a:avLst/>
@@ -3856,14 +3919,14 @@
           <a:p>
             <a:pPr algn="ctr"/>
             <a:r>
-              <a:rPr lang="en-US" sz="1600" dirty="0" smtClean="0">
+              <a:rPr lang="en-US" sz="1400" dirty="0">
                 <a:solidFill>
                   <a:schemeClr val="bg1"/>
                 </a:solidFill>
               </a:rPr>
               <a:t>:Logic</a:t>
             </a:r>
-            <a:endParaRPr lang="en-SG" sz="1600" dirty="0">
+            <a:endParaRPr lang="en-SG" sz="1400" dirty="0">
               <a:solidFill>
                 <a:schemeClr val="bg1"/>
               </a:solidFill>
@@ -3874,13 +3937,15 @@
       <p:cxnSp>
         <p:nvCxnSpPr>
           <p:cNvPr id="17" name="Straight Connector 16"/>
-          <p:cNvCxnSpPr/>
+          <p:cNvCxnSpPr>
+            <a:cxnSpLocks/>
+          </p:cNvCxnSpPr>
           <p:nvPr/>
         </p:nvCxnSpPr>
         <p:spPr>
           <a:xfrm>
-            <a:off x="3882400" y="975284"/>
-            <a:ext cx="0" cy="1723059"/>
+            <a:off x="1754498" y="925976"/>
+            <a:ext cx="0" cy="2045824"/>
           </a:xfrm>
           <a:prstGeom prst="line">
             <a:avLst/>
@@ -3916,8 +3981,8 @@
         </p:nvSpPr>
         <p:spPr>
           <a:xfrm>
-            <a:off x="3810392" y="1433477"/>
-            <a:ext cx="144016" cy="832525"/>
+            <a:off x="1720788" y="1433477"/>
+            <a:ext cx="128925" cy="1286799"/>
           </a:xfrm>
           <a:prstGeom prst="rect">
             <a:avLst/>
@@ -4003,7 +4068,7 @@
           <a:p>
             <a:pPr algn="ctr"/>
             <a:r>
-              <a:rPr lang="en-US" sz="1600" dirty="0" smtClean="0">
+              <a:rPr lang="en-US" sz="1600" dirty="0">
                 <a:solidFill>
                   <a:schemeClr val="bg1"/>
                 </a:solidFill>
@@ -4063,8 +4128,8 @@
         </p:nvSpPr>
         <p:spPr>
           <a:xfrm>
-            <a:off x="5791592" y="1538408"/>
-            <a:ext cx="142006" cy="651394"/>
+            <a:off x="5791592" y="2042370"/>
+            <a:ext cx="131293" cy="147431"/>
           </a:xfrm>
           <a:prstGeom prst="rect">
             <a:avLst/>
@@ -4109,13 +4174,15 @@
       <p:cxnSp>
         <p:nvCxnSpPr>
           <p:cNvPr id="23" name="Straight Arrow Connector 22"/>
-          <p:cNvCxnSpPr/>
+          <p:cNvCxnSpPr>
+            <a:cxnSpLocks/>
+          </p:cNvCxnSpPr>
           <p:nvPr/>
         </p:nvCxnSpPr>
         <p:spPr>
           <a:xfrm>
-            <a:off x="466818" y="1325979"/>
-            <a:ext cx="1119851" cy="0"/>
+            <a:off x="314394" y="1322292"/>
+            <a:ext cx="520267" cy="0"/>
           </a:xfrm>
           <a:prstGeom prst="straightConnector1">
             <a:avLst/>
@@ -4150,7 +4217,7 @@
         </p:nvSpPr>
         <p:spPr>
           <a:xfrm>
-            <a:off x="466818" y="1345880"/>
+            <a:off x="0" y="1345880"/>
             <a:ext cx="860170" cy="215444"/>
           </a:xfrm>
           <a:prstGeom prst="rect">
@@ -4165,23 +4232,24 @@
           <a:lstStyle/>
           <a:p>
             <a:r>
-              <a:rPr lang="en-US" sz="1400" dirty="0" smtClean="0"/>
-              <a:t>delete 1</a:t>
-            </a:r>
-            <a:endParaRPr lang="en-US" sz="1400" dirty="0"/>
+              <a:rPr lang="en-US" sz="1400" dirty="0"/>
+              <a:t>remark 1 r/</a:t>
+            </a:r>
           </a:p>
         </p:txBody>
       </p:sp>
       <p:cxnSp>
         <p:nvCxnSpPr>
           <p:cNvPr id="25" name="Straight Arrow Connector 24"/>
-          <p:cNvCxnSpPr/>
+          <p:cNvCxnSpPr>
+            <a:cxnSpLocks/>
+          </p:cNvCxnSpPr>
           <p:nvPr/>
         </p:nvCxnSpPr>
         <p:spPr>
           <a:xfrm>
-            <a:off x="1739069" y="1433478"/>
-            <a:ext cx="2071323" cy="0"/>
+            <a:off x="882216" y="1526669"/>
+            <a:ext cx="875079" cy="0"/>
           </a:xfrm>
           <a:prstGeom prst="straightConnector1">
             <a:avLst/>
@@ -4216,8 +4284,8 @@
         </p:nvSpPr>
         <p:spPr>
           <a:xfrm>
-            <a:off x="2166172" y="1453379"/>
-            <a:ext cx="1424846" cy="215444"/>
+            <a:off x="956082" y="1495717"/>
+            <a:ext cx="940195" cy="430886"/>
           </a:xfrm>
           <a:prstGeom prst="rect">
             <a:avLst/>
@@ -4231,31 +4299,38 @@
           <a:lstStyle/>
           <a:p>
             <a:r>
-              <a:rPr lang="en-US" sz="1400" dirty="0" smtClean="0">
+              <a:rPr lang="en-US" sz="1400" dirty="0">
                 <a:solidFill>
                   <a:srgbClr val="0070C0"/>
                 </a:solidFill>
               </a:rPr>
-              <a:t>execute(“delete 1”)</a:t>
-            </a:r>
-            <a:endParaRPr lang="en-US" sz="1400" dirty="0">
-              <a:solidFill>
-                <a:srgbClr val="0070C0"/>
-              </a:solidFill>
-            </a:endParaRPr>
+              <a:t>Execute</a:t>
+            </a:r>
+          </a:p>
+          <a:p>
+            <a:r>
+              <a:rPr lang="en-US" sz="1400" dirty="0">
+                <a:solidFill>
+                  <a:srgbClr val="0070C0"/>
+                </a:solidFill>
+              </a:rPr>
+              <a:t>(“remark 1”) </a:t>
+            </a:r>
           </a:p>
         </p:txBody>
       </p:sp>
       <p:cxnSp>
         <p:nvCxnSpPr>
           <p:cNvPr id="28" name="Straight Arrow Connector 27"/>
-          <p:cNvCxnSpPr/>
+          <p:cNvCxnSpPr>
+            <a:cxnSpLocks/>
+          </p:cNvCxnSpPr>
           <p:nvPr/>
         </p:nvCxnSpPr>
         <p:spPr>
           <a:xfrm>
-            <a:off x="3954408" y="1538409"/>
-            <a:ext cx="1837184" cy="0"/>
+            <a:off x="1849713" y="2136501"/>
+            <a:ext cx="3180307" cy="0"/>
           </a:xfrm>
           <a:prstGeom prst="straightConnector1">
             <a:avLst/>
@@ -4290,8 +4365,8 @@
         </p:nvSpPr>
         <p:spPr>
           <a:xfrm>
-            <a:off x="4299772" y="1542583"/>
-            <a:ext cx="1424846" cy="215444"/>
+            <a:off x="4783019" y="1946813"/>
+            <a:ext cx="1006966" cy="153888"/>
           </a:xfrm>
           <a:prstGeom prst="rect">
             <a:avLst/>
@@ -4305,26 +4380,21 @@
           <a:lstStyle/>
           <a:p>
             <a:r>
-              <a:rPr lang="en-US" sz="1400" dirty="0" err="1" smtClean="0">
+              <a:rPr lang="en-US" sz="1000" dirty="0" err="1">
                 <a:solidFill>
                   <a:srgbClr val="7030A0"/>
                 </a:solidFill>
               </a:rPr>
-              <a:t>deletePerson</a:t>
-            </a:r>
-            <a:r>
-              <a:rPr lang="en-US" sz="1400" dirty="0" smtClean="0">
+              <a:t>remarkWorkout</a:t>
+            </a:r>
+            <a:r>
+              <a:rPr lang="en-US" sz="1000" dirty="0">
                 <a:solidFill>
                   <a:srgbClr val="7030A0"/>
                 </a:solidFill>
               </a:rPr>
-              <a:t>(p)</a:t>
-            </a:r>
-            <a:endParaRPr lang="en-US" sz="1400" dirty="0">
-              <a:solidFill>
-                <a:srgbClr val="7030A0"/>
-              </a:solidFill>
-            </a:endParaRPr>
+              <a:t>(w)</a:t>
+            </a:r>
           </a:p>
         </p:txBody>
       </p:sp>
@@ -4336,8 +4406,8 @@
         </p:nvSpPr>
         <p:spPr>
           <a:xfrm>
-            <a:off x="6074030" y="1687656"/>
-            <a:ext cx="2438400" cy="215444"/>
+            <a:off x="6074029" y="1687656"/>
+            <a:ext cx="2568433" cy="215444"/>
           </a:xfrm>
           <a:prstGeom prst="rect">
             <a:avLst/>
@@ -4351,7 +4421,7 @@
           <a:lstStyle/>
           <a:p>
             <a:r>
-              <a:rPr lang="en-US" sz="1400" dirty="0" smtClean="0">
+              <a:rPr lang="en-US" sz="1400" dirty="0">
                 <a:solidFill>
                   <a:schemeClr val="accent5">
                     <a:lumMod val="75000"/>
@@ -4361,17 +4431,17 @@
               <a:t>post(</a:t>
             </a:r>
             <a:r>
-              <a:rPr lang="en-US" sz="1400" dirty="0" err="1" smtClean="0">
+              <a:rPr lang="en-US" sz="1400" dirty="0" err="1">
                 <a:solidFill>
                   <a:schemeClr val="accent5">
                     <a:lumMod val="75000"/>
                   </a:schemeClr>
                 </a:solidFill>
               </a:rPr>
-              <a:t>AddressBookChangedEvent</a:t>
-            </a:r>
-            <a:r>
-              <a:rPr lang="en-US" sz="1400" dirty="0" smtClean="0">
+              <a:t>WorkoutBookChangedEvent</a:t>
+            </a:r>
+            <a:r>
+              <a:rPr lang="en-US" sz="1400" dirty="0">
                 <a:solidFill>
                   <a:schemeClr val="accent5">
                     <a:lumMod val="75000"/>
@@ -4380,26 +4450,21 @@
               </a:rPr>
               <a:t>)</a:t>
             </a:r>
-            <a:endParaRPr lang="en-US" sz="1400" dirty="0">
-              <a:solidFill>
-                <a:schemeClr val="accent5">
-                  <a:lumMod val="75000"/>
-                </a:schemeClr>
-              </a:solidFill>
-            </a:endParaRPr>
           </a:p>
         </p:txBody>
       </p:sp>
       <p:cxnSp>
         <p:nvCxnSpPr>
           <p:cNvPr id="34" name="Straight Arrow Connector 33"/>
-          <p:cNvCxnSpPr/>
+          <p:cNvCxnSpPr>
+            <a:cxnSpLocks/>
+          </p:cNvCxnSpPr>
           <p:nvPr/>
         </p:nvCxnSpPr>
         <p:spPr>
           <a:xfrm>
-            <a:off x="3954408" y="2190681"/>
-            <a:ext cx="1837184" cy="0"/>
+            <a:off x="5106546" y="2189802"/>
+            <a:ext cx="670771" cy="0"/>
           </a:xfrm>
           <a:prstGeom prst="straightConnector1">
             <a:avLst/>
@@ -4431,13 +4496,15 @@
       <p:cxnSp>
         <p:nvCxnSpPr>
           <p:cNvPr id="35" name="Straight Arrow Connector 34"/>
-          <p:cNvCxnSpPr/>
+          <p:cNvCxnSpPr>
+            <a:cxnSpLocks/>
+          </p:cNvCxnSpPr>
           <p:nvPr/>
         </p:nvCxnSpPr>
         <p:spPr>
           <a:xfrm>
-            <a:off x="1739069" y="2266002"/>
-            <a:ext cx="2058118" cy="0"/>
+            <a:off x="863702" y="2704918"/>
+            <a:ext cx="910580" cy="0"/>
           </a:xfrm>
           <a:prstGeom prst="straightConnector1">
             <a:avLst/>
@@ -4469,13 +4536,15 @@
       <p:cxnSp>
         <p:nvCxnSpPr>
           <p:cNvPr id="37" name="Straight Arrow Connector 36"/>
-          <p:cNvCxnSpPr/>
+          <p:cNvCxnSpPr>
+            <a:cxnSpLocks/>
+          </p:cNvCxnSpPr>
           <p:nvPr/>
         </p:nvCxnSpPr>
         <p:spPr>
           <a:xfrm>
-            <a:off x="390618" y="2342202"/>
-            <a:ext cx="1196051" cy="0"/>
+            <a:off x="280102" y="2724479"/>
+            <a:ext cx="561219" cy="0"/>
           </a:xfrm>
           <a:prstGeom prst="straightConnector1">
             <a:avLst/>
@@ -4552,7 +4621,7 @@
           <a:p>
             <a:pPr algn="ctr"/>
             <a:r>
-              <a:rPr lang="en-US" sz="1600" dirty="0" smtClean="0">
+              <a:rPr lang="en-US" sz="1600" dirty="0">
                 <a:solidFill>
                   <a:schemeClr val="bg1"/>
                 </a:solidFill>
@@ -4560,7 +4629,7 @@
               <a:t>:</a:t>
             </a:r>
             <a:r>
-              <a:rPr lang="en-US" sz="1600" dirty="0" err="1" smtClean="0">
+              <a:rPr lang="en-US" sz="1600" dirty="0" err="1">
                 <a:solidFill>
                   <a:schemeClr val="bg1"/>
                 </a:solidFill>
@@ -4583,7 +4652,7 @@
         </p:nvCxnSpPr>
         <p:spPr>
           <a:xfrm>
-            <a:off x="8616802" y="944305"/>
+            <a:off x="8507577" y="954686"/>
             <a:ext cx="0" cy="1723059"/>
           </a:xfrm>
           <a:prstGeom prst="line">
@@ -4622,7 +4691,7 @@
         </p:nvSpPr>
         <p:spPr>
           <a:xfrm>
-            <a:off x="8544794" y="1961202"/>
+            <a:off x="8436574" y="2004267"/>
             <a:ext cx="142006" cy="176787"/>
           </a:xfrm>
           <a:prstGeom prst="rect">
@@ -4677,7 +4746,7 @@
         </p:nvCxnSpPr>
         <p:spPr>
           <a:xfrm>
-            <a:off x="5943992" y="1961202"/>
+            <a:off x="5922885" y="2055029"/>
             <a:ext cx="2568438" cy="0"/>
           </a:xfrm>
           <a:prstGeom prst="straightConnector1">
@@ -4713,7 +4782,7 @@
         </p:nvCxnSpPr>
         <p:spPr>
           <a:xfrm>
-            <a:off x="5943992" y="2137989"/>
+            <a:off x="5922885" y="2189801"/>
             <a:ext cx="2549946" cy="0"/>
           </a:xfrm>
           <a:prstGeom prst="straightConnector1">
@@ -4793,7 +4862,7 @@
           <a:p>
             <a:pPr algn="ctr"/>
             <a:r>
-              <a:rPr lang="en-US" sz="1600" dirty="0" smtClean="0">
+              <a:rPr lang="en-US" sz="1600" dirty="0">
                 <a:solidFill>
                   <a:schemeClr val="bg1"/>
                 </a:solidFill>
@@ -4925,7 +4994,7 @@
           <a:lstStyle/>
           <a:p>
             <a:r>
-              <a:rPr lang="en-US" sz="1400" dirty="0" smtClean="0">
+              <a:rPr lang="en-US" sz="1400" dirty="0">
                 <a:solidFill>
                   <a:schemeClr val="accent5">
                     <a:lumMod val="75000"/>
@@ -4935,17 +5004,17 @@
               <a:t>post(</a:t>
             </a:r>
             <a:r>
-              <a:rPr lang="en-US" sz="1400" dirty="0" err="1" smtClean="0">
+              <a:rPr lang="en-US" sz="1400" dirty="0" err="1">
                 <a:solidFill>
                   <a:schemeClr val="accent5">
                     <a:lumMod val="75000"/>
                   </a:schemeClr>
                 </a:solidFill>
               </a:rPr>
-              <a:t>AddressBookChangedEvent</a:t>
-            </a:r>
-            <a:r>
-              <a:rPr lang="en-US" sz="1400" dirty="0" smtClean="0">
+              <a:t>WorkoutBookChangedEvent</a:t>
+            </a:r>
+            <a:r>
+              <a:rPr lang="en-US" sz="1400" dirty="0">
                 <a:solidFill>
                   <a:schemeClr val="accent5">
                     <a:lumMod val="75000"/>
@@ -4954,13 +5023,6 @@
               </a:rPr>
               <a:t>)</a:t>
             </a:r>
-            <a:endParaRPr lang="en-US" sz="1400" dirty="0">
-              <a:solidFill>
-                <a:schemeClr val="accent5">
-                  <a:lumMod val="75000"/>
-                </a:schemeClr>
-              </a:solidFill>
-            </a:endParaRPr>
           </a:p>
         </p:txBody>
       </p:sp>
@@ -5052,7 +5114,7 @@
           <a:p>
             <a:pPr algn="ctr"/>
             <a:r>
-              <a:rPr lang="en-US" sz="1600" dirty="0" smtClean="0">
+              <a:rPr lang="en-US" sz="1600" dirty="0">
                 <a:solidFill>
                   <a:schemeClr val="bg1"/>
                 </a:solidFill>
@@ -5060,7 +5122,7 @@
               <a:t>:</a:t>
             </a:r>
             <a:r>
-              <a:rPr lang="en-US" sz="1600" dirty="0" err="1" smtClean="0">
+              <a:rPr lang="en-US" sz="1600" dirty="0" err="1">
                 <a:solidFill>
                   <a:schemeClr val="bg1"/>
                 </a:solidFill>
@@ -5307,17 +5369,17 @@
           <a:lstStyle/>
           <a:p>
             <a:r>
-              <a:rPr lang="en-US" sz="1400" dirty="0" err="1" smtClean="0">
+              <a:rPr lang="en-US" sz="1400" dirty="0" err="1">
                 <a:solidFill>
                   <a:schemeClr val="accent6">
                     <a:lumMod val="75000"/>
                   </a:schemeClr>
                 </a:solidFill>
               </a:rPr>
-              <a:t>handleAddresssBookChangedEvent</a:t>
-            </a:r>
-            <a:r>
-              <a:rPr lang="en-US" sz="1400" dirty="0" smtClean="0">
+              <a:t>handleWorkoutBookChangedEvent</a:t>
+            </a:r>
+            <a:r>
+              <a:rPr lang="en-US" sz="1400" dirty="0">
                 <a:solidFill>
                   <a:schemeClr val="accent6">
                     <a:lumMod val="75000"/>
@@ -5326,26 +5388,21 @@
               </a:rPr>
               <a:t>()</a:t>
             </a:r>
-            <a:endParaRPr lang="en-US" sz="1400" dirty="0">
-              <a:solidFill>
-                <a:schemeClr val="accent6">
-                  <a:lumMod val="75000"/>
-                </a:schemeClr>
-              </a:solidFill>
-            </a:endParaRPr>
           </a:p>
         </p:txBody>
       </p:sp>
       <p:cxnSp>
         <p:nvCxnSpPr>
           <p:cNvPr id="85" name="Straight Connector 84"/>
-          <p:cNvCxnSpPr/>
+          <p:cNvCxnSpPr>
+            <a:cxnSpLocks/>
+          </p:cNvCxnSpPr>
           <p:nvPr/>
         </p:nvCxnSpPr>
         <p:spPr>
           <a:xfrm flipH="1">
             <a:off x="314394" y="1099672"/>
-            <a:ext cx="24" cy="1598671"/>
+            <a:ext cx="24" cy="2024528"/>
           </a:xfrm>
           <a:prstGeom prst="line">
             <a:avLst/>
@@ -5417,7 +5474,7 @@
           <a:p>
             <a:pPr algn="ctr"/>
             <a:r>
-              <a:rPr lang="en-US" sz="1600" dirty="0" smtClean="0">
+              <a:rPr lang="en-US" sz="1600" dirty="0">
                 <a:solidFill>
                   <a:schemeClr val="bg1"/>
                 </a:solidFill>
@@ -5620,26 +5677,21 @@
           <a:lstStyle/>
           <a:p>
             <a:r>
-              <a:rPr lang="en-US" sz="1400" dirty="0" err="1" smtClean="0">
+              <a:rPr lang="en-US" sz="1400" dirty="0" err="1">
                 <a:solidFill>
                   <a:srgbClr val="00B050"/>
                 </a:solidFill>
               </a:rPr>
-              <a:t>handleAddresssBookChangedEvent</a:t>
-            </a:r>
-            <a:r>
-              <a:rPr lang="en-US" sz="1400" dirty="0" smtClean="0">
+              <a:t>handleWorkoutBookChangedEvent</a:t>
+            </a:r>
+            <a:r>
+              <a:rPr lang="en-US" sz="1400" dirty="0">
                 <a:solidFill>
                   <a:srgbClr val="00B050"/>
                 </a:solidFill>
               </a:rPr>
               <a:t>()</a:t>
             </a:r>
-            <a:endParaRPr lang="en-US" sz="1400" dirty="0">
-              <a:solidFill>
-                <a:srgbClr val="00B050"/>
-              </a:solidFill>
-            </a:endParaRPr>
           </a:p>
         </p:txBody>
       </p:sp>
@@ -5826,18 +5878,13 @@
           <a:p>
             <a:pPr algn="r"/>
             <a:r>
-              <a:rPr lang="en-US" sz="1400" dirty="0" smtClean="0">
+              <a:rPr lang="en-US" sz="1400" dirty="0">
                 <a:solidFill>
                   <a:srgbClr val="00B050"/>
                 </a:solidFill>
               </a:rPr>
               <a:t>Update status bar</a:t>
             </a:r>
-            <a:endParaRPr lang="en-US" sz="1400" dirty="0">
-              <a:solidFill>
-                <a:srgbClr val="00B050"/>
-              </a:solidFill>
-            </a:endParaRPr>
           </a:p>
         </p:txBody>
       </p:sp>
@@ -6027,7 +6074,7 @@
           <a:lstStyle/>
           <a:p>
             <a:r>
-              <a:rPr lang="en-US" sz="1400" dirty="0" smtClean="0">
+              <a:rPr lang="en-US" sz="1400" dirty="0">
                 <a:solidFill>
                   <a:schemeClr val="accent6">
                     <a:lumMod val="75000"/>
@@ -6037,7 +6084,7 @@
               <a:t>Save </a:t>
             </a:r>
             <a:br>
-              <a:rPr lang="en-US" sz="1400" dirty="0" smtClean="0">
+              <a:rPr lang="en-US" sz="1400" dirty="0">
                 <a:solidFill>
                   <a:schemeClr val="accent6">
                     <a:lumMod val="75000"/>
@@ -6046,7 +6093,7 @@
               </a:rPr>
             </a:br>
             <a:r>
-              <a:rPr lang="en-US" sz="1400" dirty="0" smtClean="0">
+              <a:rPr lang="en-US" sz="1400" dirty="0">
                 <a:solidFill>
                   <a:schemeClr val="accent6">
                     <a:lumMod val="75000"/>
@@ -6055,20 +6102,1438 @@
               </a:rPr>
               <a:t>to file</a:t>
             </a:r>
-            <a:endParaRPr lang="en-US" sz="1400" dirty="0">
+          </a:p>
+        </p:txBody>
+      </p:sp>
+      <p:cxnSp>
+        <p:nvCxnSpPr>
+          <p:cNvPr id="71" name="Straight Arrow Connector 70">
+            <a:extLst>
+              <a:ext uri="{FF2B5EF4-FFF2-40B4-BE49-F238E27FC236}">
+                <a16:creationId xmlns:a16="http://schemas.microsoft.com/office/drawing/2014/main" id="{3A7B1315-BFBA-E446-A9BA-2C03225B974E}"/>
+              </a:ext>
+            </a:extLst>
+          </p:cNvPr>
+          <p:cNvCxnSpPr>
+            <a:cxnSpLocks/>
+          </p:cNvCxnSpPr>
+          <p:nvPr/>
+        </p:nvCxnSpPr>
+        <p:spPr>
+          <a:xfrm>
+            <a:off x="1896277" y="1569360"/>
+            <a:ext cx="613168" cy="0"/>
+          </a:xfrm>
+          <a:prstGeom prst="straightConnector1">
+            <a:avLst/>
+          </a:prstGeom>
+          <a:ln w="19050">
+            <a:solidFill>
+              <a:srgbClr val="0070C0"/>
+            </a:solidFill>
+            <a:tailEnd type="arrow"/>
+          </a:ln>
+        </p:spPr>
+        <p:style>
+          <a:lnRef idx="1">
+            <a:schemeClr val="accent1"/>
+          </a:lnRef>
+          <a:fillRef idx="0">
+            <a:schemeClr val="accent1"/>
+          </a:fillRef>
+          <a:effectRef idx="0">
+            <a:schemeClr val="accent1"/>
+          </a:effectRef>
+          <a:fontRef idx="minor">
+            <a:schemeClr val="tx1"/>
+          </a:fontRef>
+        </p:style>
+      </p:cxnSp>
+      <p:sp>
+        <p:nvSpPr>
+          <p:cNvPr id="75" name="Rectangle 62">
+            <a:extLst>
+              <a:ext uri="{FF2B5EF4-FFF2-40B4-BE49-F238E27FC236}">
+                <a16:creationId xmlns:a16="http://schemas.microsoft.com/office/drawing/2014/main" id="{47E38565-7D5C-3A49-B4FF-E96F72368388}"/>
+              </a:ext>
+            </a:extLst>
+          </p:cNvPr>
+          <p:cNvSpPr/>
+          <p:nvPr/>
+        </p:nvSpPr>
+        <p:spPr>
+          <a:xfrm>
+            <a:off x="2169590" y="594190"/>
+            <a:ext cx="1105537" cy="323945"/>
+          </a:xfrm>
+          <a:prstGeom prst="rect">
+            <a:avLst/>
+          </a:prstGeom>
+          <a:solidFill>
+            <a:srgbClr val="0070C0"/>
+          </a:solidFill>
+          <a:ln w="19050">
+            <a:solidFill>
+              <a:srgbClr val="0070C0"/>
+            </a:solidFill>
+          </a:ln>
+          <a:effectLst/>
+        </p:spPr>
+        <p:style>
+          <a:lnRef idx="1">
+            <a:schemeClr val="accent2"/>
+          </a:lnRef>
+          <a:fillRef idx="2">
+            <a:schemeClr val="accent2"/>
+          </a:fillRef>
+          <a:effectRef idx="1">
+            <a:schemeClr val="accent2"/>
+          </a:effectRef>
+          <a:fontRef idx="minor">
+            <a:schemeClr val="dk1"/>
+          </a:fontRef>
+        </p:style>
+        <p:txBody>
+          <a:bodyPr rtlCol="0" anchor="ctr"/>
+          <a:lstStyle/>
+          <a:p>
+            <a:pPr algn="ctr"/>
+            <a:r>
+              <a:rPr lang="en-US" sz="1200" dirty="0">
+                <a:solidFill>
+                  <a:schemeClr val="bg1"/>
+                </a:solidFill>
+              </a:rPr>
+              <a:t>:</a:t>
+            </a:r>
+            <a:r>
+              <a:rPr lang="en-US" sz="1200" dirty="0" err="1">
+                <a:solidFill>
+                  <a:schemeClr val="bg1"/>
+                </a:solidFill>
+              </a:rPr>
+              <a:t>WorkoutBookParser</a:t>
+            </a:r>
+            <a:endParaRPr lang="en-SG" sz="1200" dirty="0">
               <a:solidFill>
-                <a:schemeClr val="accent6">
-                  <a:lumMod val="75000"/>
-                </a:schemeClr>
+                <a:schemeClr val="bg1"/>
               </a:solidFill>
             </a:endParaRPr>
+          </a:p>
+        </p:txBody>
+      </p:sp>
+      <p:cxnSp>
+        <p:nvCxnSpPr>
+          <p:cNvPr id="76" name="Straight Connector 75">
+            <a:extLst>
+              <a:ext uri="{FF2B5EF4-FFF2-40B4-BE49-F238E27FC236}">
+                <a16:creationId xmlns:a16="http://schemas.microsoft.com/office/drawing/2014/main" id="{62919274-CA11-BC4C-8F20-BCD1F28DF2CB}"/>
+              </a:ext>
+            </a:extLst>
+          </p:cNvPr>
+          <p:cNvCxnSpPr>
+            <a:cxnSpLocks/>
+          </p:cNvCxnSpPr>
+          <p:nvPr/>
+        </p:nvCxnSpPr>
+        <p:spPr>
+          <a:xfrm flipH="1">
+            <a:off x="2577280" y="925976"/>
+            <a:ext cx="8565" cy="1075644"/>
+          </a:xfrm>
+          <a:prstGeom prst="line">
+            <a:avLst/>
+          </a:prstGeom>
+          <a:ln w="19050">
+            <a:solidFill>
+              <a:srgbClr val="0070C0"/>
+            </a:solidFill>
+            <a:prstDash val="sysDash"/>
+          </a:ln>
+          <a:effectLst/>
+        </p:spPr>
+        <p:style>
+          <a:lnRef idx="1">
+            <a:schemeClr val="accent1"/>
+          </a:lnRef>
+          <a:fillRef idx="2">
+            <a:schemeClr val="accent1"/>
+          </a:fillRef>
+          <a:effectRef idx="1">
+            <a:schemeClr val="accent1"/>
+          </a:effectRef>
+          <a:fontRef idx="minor">
+            <a:schemeClr val="dk1"/>
+          </a:fontRef>
+        </p:style>
+      </p:cxnSp>
+      <p:cxnSp>
+        <p:nvCxnSpPr>
+          <p:cNvPr id="77" name="Straight Arrow Connector 76">
+            <a:extLst>
+              <a:ext uri="{FF2B5EF4-FFF2-40B4-BE49-F238E27FC236}">
+                <a16:creationId xmlns:a16="http://schemas.microsoft.com/office/drawing/2014/main" id="{1B7770DD-C2F0-2C49-BA9F-C7EBD8D62BBE}"/>
+              </a:ext>
+            </a:extLst>
+          </p:cNvPr>
+          <p:cNvCxnSpPr>
+            <a:cxnSpLocks/>
+          </p:cNvCxnSpPr>
+          <p:nvPr/>
+        </p:nvCxnSpPr>
+        <p:spPr>
+          <a:xfrm>
+            <a:off x="1835631" y="1964111"/>
+            <a:ext cx="734460" cy="0"/>
+          </a:xfrm>
+          <a:prstGeom prst="straightConnector1">
+            <a:avLst/>
+          </a:prstGeom>
+          <a:ln w="19050">
+            <a:solidFill>
+              <a:srgbClr val="0070C0"/>
+            </a:solidFill>
+            <a:prstDash val="sysDash"/>
+            <a:headEnd type="arrow" w="med" len="med"/>
+            <a:tailEnd type="none" w="med" len="med"/>
+          </a:ln>
+        </p:spPr>
+        <p:style>
+          <a:lnRef idx="1">
+            <a:schemeClr val="accent1"/>
+          </a:lnRef>
+          <a:fillRef idx="0">
+            <a:schemeClr val="accent1"/>
+          </a:fillRef>
+          <a:effectRef idx="0">
+            <a:schemeClr val="accent1"/>
+          </a:effectRef>
+          <a:fontRef idx="minor">
+            <a:schemeClr val="tx1"/>
+          </a:fontRef>
+        </p:style>
+      </p:cxnSp>
+      <p:sp>
+        <p:nvSpPr>
+          <p:cNvPr id="78" name="Rectangle 77">
+            <a:extLst>
+              <a:ext uri="{FF2B5EF4-FFF2-40B4-BE49-F238E27FC236}">
+                <a16:creationId xmlns:a16="http://schemas.microsoft.com/office/drawing/2014/main" id="{C6EEB8B8-24B9-064C-914D-A29B66663FAC}"/>
+              </a:ext>
+            </a:extLst>
+          </p:cNvPr>
+          <p:cNvSpPr/>
+          <p:nvPr/>
+        </p:nvSpPr>
+        <p:spPr>
+          <a:xfrm>
+            <a:off x="2479580" y="1495717"/>
+            <a:ext cx="162641" cy="464662"/>
+          </a:xfrm>
+          <a:prstGeom prst="rect">
+            <a:avLst/>
+          </a:prstGeom>
+          <a:solidFill>
+            <a:srgbClr val="0070C0"/>
+          </a:solidFill>
+          <a:ln>
+            <a:solidFill>
+              <a:srgbClr val="0070C0"/>
+            </a:solidFill>
+          </a:ln>
+          <a:effectLst/>
+        </p:spPr>
+        <p:style>
+          <a:lnRef idx="1">
+            <a:schemeClr val="accent3"/>
+          </a:lnRef>
+          <a:fillRef idx="2">
+            <a:schemeClr val="accent3"/>
+          </a:fillRef>
+          <a:effectRef idx="1">
+            <a:schemeClr val="accent3"/>
+          </a:effectRef>
+          <a:fontRef idx="minor">
+            <a:schemeClr val="dk1"/>
+          </a:fontRef>
+        </p:style>
+        <p:txBody>
+          <a:bodyPr rtlCol="0" anchor="ctr"/>
+          <a:lstStyle/>
+          <a:p>
+            <a:pPr algn="ctr"/>
+            <a:endParaRPr lang="en-SG" sz="1400"/>
+          </a:p>
+        </p:txBody>
+      </p:sp>
+      <p:sp>
+        <p:nvSpPr>
+          <p:cNvPr id="82" name="Rectangle 81">
+            <a:extLst>
+              <a:ext uri="{FF2B5EF4-FFF2-40B4-BE49-F238E27FC236}">
+                <a16:creationId xmlns:a16="http://schemas.microsoft.com/office/drawing/2014/main" id="{B3C24F82-014D-CE46-BE3E-BED17936BD63}"/>
+              </a:ext>
+            </a:extLst>
+          </p:cNvPr>
+          <p:cNvSpPr/>
+          <p:nvPr/>
+        </p:nvSpPr>
+        <p:spPr>
+          <a:xfrm>
+            <a:off x="3560006" y="1344922"/>
+            <a:ext cx="124990" cy="319923"/>
+          </a:xfrm>
+          <a:prstGeom prst="rect">
+            <a:avLst/>
+          </a:prstGeom>
+          <a:solidFill>
+            <a:srgbClr val="0070C0"/>
+          </a:solidFill>
+          <a:ln>
+            <a:solidFill>
+              <a:srgbClr val="0070C0"/>
+            </a:solidFill>
+          </a:ln>
+          <a:effectLst/>
+        </p:spPr>
+        <p:style>
+          <a:lnRef idx="1">
+            <a:schemeClr val="accent3"/>
+          </a:lnRef>
+          <a:fillRef idx="2">
+            <a:schemeClr val="accent3"/>
+          </a:fillRef>
+          <a:effectRef idx="1">
+            <a:schemeClr val="accent3"/>
+          </a:effectRef>
+          <a:fontRef idx="minor">
+            <a:schemeClr val="dk1"/>
+          </a:fontRef>
+        </p:style>
+        <p:txBody>
+          <a:bodyPr rtlCol="0" anchor="ctr"/>
+          <a:lstStyle/>
+          <a:p>
+            <a:pPr algn="ctr"/>
+            <a:endParaRPr lang="en-SG" sz="1400"/>
+          </a:p>
+        </p:txBody>
+      </p:sp>
+      <p:sp>
+        <p:nvSpPr>
+          <p:cNvPr id="79" name="Rectangle 62">
+            <a:extLst>
+              <a:ext uri="{FF2B5EF4-FFF2-40B4-BE49-F238E27FC236}">
+                <a16:creationId xmlns:a16="http://schemas.microsoft.com/office/drawing/2014/main" id="{ACA0FD7C-E13F-4346-BBFC-F48BD4AC11BA}"/>
+              </a:ext>
+            </a:extLst>
+          </p:cNvPr>
+          <p:cNvSpPr/>
+          <p:nvPr/>
+        </p:nvSpPr>
+        <p:spPr>
+          <a:xfrm>
+            <a:off x="2897084" y="1237938"/>
+            <a:ext cx="1610616" cy="319924"/>
+          </a:xfrm>
+          <a:prstGeom prst="rect">
+            <a:avLst/>
+          </a:prstGeom>
+          <a:solidFill>
+            <a:srgbClr val="0070C0"/>
+          </a:solidFill>
+          <a:ln w="19050">
+            <a:solidFill>
+              <a:srgbClr val="0070C0"/>
+            </a:solidFill>
+          </a:ln>
+          <a:effectLst/>
+        </p:spPr>
+        <p:style>
+          <a:lnRef idx="1">
+            <a:schemeClr val="accent2"/>
+          </a:lnRef>
+          <a:fillRef idx="2">
+            <a:schemeClr val="accent2"/>
+          </a:fillRef>
+          <a:effectRef idx="1">
+            <a:schemeClr val="accent2"/>
+          </a:effectRef>
+          <a:fontRef idx="minor">
+            <a:schemeClr val="dk1"/>
+          </a:fontRef>
+        </p:style>
+        <p:txBody>
+          <a:bodyPr rtlCol="0" anchor="ctr"/>
+          <a:lstStyle/>
+          <a:p>
+            <a:pPr algn="ctr"/>
+            <a:r>
+              <a:rPr lang="en-US" sz="1400" dirty="0">
+                <a:solidFill>
+                  <a:schemeClr val="bg1"/>
+                </a:solidFill>
+              </a:rPr>
+              <a:t>:</a:t>
+            </a:r>
+            <a:r>
+              <a:rPr lang="en-US" sz="1400" dirty="0" err="1">
+                <a:solidFill>
+                  <a:schemeClr val="bg1"/>
+                </a:solidFill>
+              </a:rPr>
+              <a:t>RemarkCommandParser</a:t>
+            </a:r>
+            <a:endParaRPr lang="en-SG" sz="1400" dirty="0">
+              <a:solidFill>
+                <a:schemeClr val="bg1"/>
+              </a:solidFill>
+            </a:endParaRPr>
+          </a:p>
+        </p:txBody>
+      </p:sp>
+      <p:cxnSp>
+        <p:nvCxnSpPr>
+          <p:cNvPr id="80" name="Straight Arrow Connector 79">
+            <a:extLst>
+              <a:ext uri="{FF2B5EF4-FFF2-40B4-BE49-F238E27FC236}">
+                <a16:creationId xmlns:a16="http://schemas.microsoft.com/office/drawing/2014/main" id="{61CBA2AE-EE5C-9D43-830B-A97E84B4B558}"/>
+              </a:ext>
+            </a:extLst>
+          </p:cNvPr>
+          <p:cNvCxnSpPr>
+            <a:cxnSpLocks/>
+          </p:cNvCxnSpPr>
+          <p:nvPr/>
+        </p:nvCxnSpPr>
+        <p:spPr>
+          <a:xfrm>
+            <a:off x="2652633" y="1538408"/>
+            <a:ext cx="323009" cy="0"/>
+          </a:xfrm>
+          <a:prstGeom prst="straightConnector1">
+            <a:avLst/>
+          </a:prstGeom>
+          <a:ln w="19050">
+            <a:solidFill>
+              <a:srgbClr val="0070C0"/>
+            </a:solidFill>
+            <a:tailEnd type="arrow"/>
+          </a:ln>
+        </p:spPr>
+        <p:style>
+          <a:lnRef idx="1">
+            <a:schemeClr val="accent1"/>
+          </a:lnRef>
+          <a:fillRef idx="0">
+            <a:schemeClr val="accent1"/>
+          </a:fillRef>
+          <a:effectRef idx="0">
+            <a:schemeClr val="accent1"/>
+          </a:effectRef>
+          <a:fontRef idx="minor">
+            <a:schemeClr val="tx1"/>
+          </a:fontRef>
+        </p:style>
+      </p:cxnSp>
+      <p:cxnSp>
+        <p:nvCxnSpPr>
+          <p:cNvPr id="83" name="Straight Arrow Connector 82">
+            <a:extLst>
+              <a:ext uri="{FF2B5EF4-FFF2-40B4-BE49-F238E27FC236}">
+                <a16:creationId xmlns:a16="http://schemas.microsoft.com/office/drawing/2014/main" id="{58C5025B-44DB-FE4F-97CE-EAA34DDEA2EC}"/>
+              </a:ext>
+            </a:extLst>
+          </p:cNvPr>
+          <p:cNvCxnSpPr>
+            <a:cxnSpLocks/>
+          </p:cNvCxnSpPr>
+          <p:nvPr/>
+        </p:nvCxnSpPr>
+        <p:spPr>
+          <a:xfrm>
+            <a:off x="2623639" y="1664845"/>
+            <a:ext cx="910580" cy="0"/>
+          </a:xfrm>
+          <a:prstGeom prst="straightConnector1">
+            <a:avLst/>
+          </a:prstGeom>
+          <a:ln w="19050">
+            <a:solidFill>
+              <a:srgbClr val="0070C0"/>
+            </a:solidFill>
+            <a:prstDash val="sysDash"/>
+            <a:headEnd type="arrow" w="med" len="med"/>
+            <a:tailEnd type="none" w="med" len="med"/>
+          </a:ln>
+        </p:spPr>
+        <p:style>
+          <a:lnRef idx="1">
+            <a:schemeClr val="accent1"/>
+          </a:lnRef>
+          <a:fillRef idx="0">
+            <a:schemeClr val="accent1"/>
+          </a:fillRef>
+          <a:effectRef idx="0">
+            <a:schemeClr val="accent1"/>
+          </a:effectRef>
+          <a:fontRef idx="minor">
+            <a:schemeClr val="tx1"/>
+          </a:fontRef>
+        </p:style>
+      </p:cxnSp>
+      <p:cxnSp>
+        <p:nvCxnSpPr>
+          <p:cNvPr id="84" name="Straight Connector 83">
+            <a:extLst>
+              <a:ext uri="{FF2B5EF4-FFF2-40B4-BE49-F238E27FC236}">
+                <a16:creationId xmlns:a16="http://schemas.microsoft.com/office/drawing/2014/main" id="{7AF0CFC3-D774-CC48-BBAA-B09C266622B8}"/>
+              </a:ext>
+            </a:extLst>
+          </p:cNvPr>
+          <p:cNvCxnSpPr>
+            <a:cxnSpLocks/>
+          </p:cNvCxnSpPr>
+          <p:nvPr/>
+        </p:nvCxnSpPr>
+        <p:spPr>
+          <a:xfrm flipH="1">
+            <a:off x="3631765" y="1319221"/>
+            <a:ext cx="10586" cy="723150"/>
+          </a:xfrm>
+          <a:prstGeom prst="line">
+            <a:avLst/>
+          </a:prstGeom>
+          <a:ln w="19050">
+            <a:solidFill>
+              <a:srgbClr val="0070C0"/>
+            </a:solidFill>
+            <a:prstDash val="sysDash"/>
+          </a:ln>
+          <a:effectLst/>
+        </p:spPr>
+        <p:style>
+          <a:lnRef idx="1">
+            <a:schemeClr val="accent1"/>
+          </a:lnRef>
+          <a:fillRef idx="2">
+            <a:schemeClr val="accent1"/>
+          </a:fillRef>
+          <a:effectRef idx="1">
+            <a:schemeClr val="accent1"/>
+          </a:effectRef>
+          <a:fontRef idx="minor">
+            <a:schemeClr val="dk1"/>
+          </a:fontRef>
+        </p:style>
+      </p:cxnSp>
+      <p:cxnSp>
+        <p:nvCxnSpPr>
+          <p:cNvPr id="86" name="Straight Arrow Connector 85">
+            <a:extLst>
+              <a:ext uri="{FF2B5EF4-FFF2-40B4-BE49-F238E27FC236}">
+                <a16:creationId xmlns:a16="http://schemas.microsoft.com/office/drawing/2014/main" id="{AC445F93-26B1-8A44-943B-648D48E68B56}"/>
+              </a:ext>
+            </a:extLst>
+          </p:cNvPr>
+          <p:cNvCxnSpPr>
+            <a:cxnSpLocks/>
+          </p:cNvCxnSpPr>
+          <p:nvPr/>
+        </p:nvCxnSpPr>
+        <p:spPr>
+          <a:xfrm>
+            <a:off x="2585844" y="1956307"/>
+            <a:ext cx="1056507" cy="0"/>
+          </a:xfrm>
+          <a:prstGeom prst="straightConnector1">
+            <a:avLst/>
+          </a:prstGeom>
+          <a:ln w="19050">
+            <a:solidFill>
+              <a:srgbClr val="0070C0"/>
+            </a:solidFill>
+            <a:prstDash val="sysDash"/>
+            <a:headEnd type="arrow" w="med" len="med"/>
+            <a:tailEnd type="none" w="med" len="med"/>
+          </a:ln>
+        </p:spPr>
+        <p:style>
+          <a:lnRef idx="1">
+            <a:schemeClr val="accent1"/>
+          </a:lnRef>
+          <a:fillRef idx="0">
+            <a:schemeClr val="accent1"/>
+          </a:fillRef>
+          <a:effectRef idx="0">
+            <a:schemeClr val="accent1"/>
+          </a:effectRef>
+          <a:fontRef idx="minor">
+            <a:schemeClr val="tx1"/>
+          </a:fontRef>
+        </p:style>
+      </p:cxnSp>
+      <p:sp>
+        <p:nvSpPr>
+          <p:cNvPr id="88" name="Rectangle 87">
+            <a:extLst>
+              <a:ext uri="{FF2B5EF4-FFF2-40B4-BE49-F238E27FC236}">
+                <a16:creationId xmlns:a16="http://schemas.microsoft.com/office/drawing/2014/main" id="{B5A21509-1354-1D42-B877-B0496706D8C7}"/>
+              </a:ext>
+            </a:extLst>
+          </p:cNvPr>
+          <p:cNvSpPr/>
+          <p:nvPr/>
+        </p:nvSpPr>
+        <p:spPr>
+          <a:xfrm>
+            <a:off x="3575389" y="1738263"/>
+            <a:ext cx="117818" cy="230690"/>
+          </a:xfrm>
+          <a:prstGeom prst="rect">
+            <a:avLst/>
+          </a:prstGeom>
+          <a:solidFill>
+            <a:srgbClr val="0070C0"/>
+          </a:solidFill>
+          <a:ln>
+            <a:solidFill>
+              <a:srgbClr val="0070C0"/>
+            </a:solidFill>
+          </a:ln>
+          <a:effectLst/>
+        </p:spPr>
+        <p:style>
+          <a:lnRef idx="1">
+            <a:schemeClr val="accent3"/>
+          </a:lnRef>
+          <a:fillRef idx="2">
+            <a:schemeClr val="accent3"/>
+          </a:fillRef>
+          <a:effectRef idx="1">
+            <a:schemeClr val="accent3"/>
+          </a:effectRef>
+          <a:fontRef idx="minor">
+            <a:schemeClr val="dk1"/>
+          </a:fontRef>
+        </p:style>
+        <p:txBody>
+          <a:bodyPr rtlCol="0" anchor="ctr"/>
+          <a:lstStyle/>
+          <a:p>
+            <a:pPr algn="ctr"/>
+            <a:endParaRPr lang="en-SG" sz="1400"/>
+          </a:p>
+        </p:txBody>
+      </p:sp>
+      <p:sp>
+        <p:nvSpPr>
+          <p:cNvPr id="90" name="TextBox 89">
+            <a:extLst>
+              <a:ext uri="{FF2B5EF4-FFF2-40B4-BE49-F238E27FC236}">
+                <a16:creationId xmlns:a16="http://schemas.microsoft.com/office/drawing/2014/main" id="{503CFA5C-AD56-014A-952F-ECE10E0A63B4}"/>
+              </a:ext>
+            </a:extLst>
+          </p:cNvPr>
+          <p:cNvSpPr txBox="1"/>
+          <p:nvPr/>
+        </p:nvSpPr>
+        <p:spPr>
+          <a:xfrm>
+            <a:off x="3501895" y="1935338"/>
+            <a:ext cx="258404" cy="261610"/>
+          </a:xfrm>
+          <a:prstGeom prst="rect">
+            <a:avLst/>
+          </a:prstGeom>
+          <a:noFill/>
+        </p:spPr>
+        <p:txBody>
+          <a:bodyPr wrap="none" rtlCol="0">
+            <a:spAutoFit/>
+          </a:bodyPr>
+          <a:lstStyle/>
+          <a:p>
+            <a:r>
+              <a:rPr lang="en-SG" sz="1100" dirty="0">
+                <a:solidFill>
+                  <a:srgbClr val="002060"/>
+                </a:solidFill>
+              </a:rPr>
+              <a:t>X</a:t>
+            </a:r>
+          </a:p>
+        </p:txBody>
+      </p:sp>
+      <p:sp>
+        <p:nvSpPr>
+          <p:cNvPr id="91" name="TextBox 90">
+            <a:extLst>
+              <a:ext uri="{FF2B5EF4-FFF2-40B4-BE49-F238E27FC236}">
+                <a16:creationId xmlns:a16="http://schemas.microsoft.com/office/drawing/2014/main" id="{A9E72F8F-9B7D-504E-AAE2-F90EFBFE47B0}"/>
+              </a:ext>
+            </a:extLst>
+          </p:cNvPr>
+          <p:cNvSpPr txBox="1"/>
+          <p:nvPr/>
+        </p:nvSpPr>
+        <p:spPr>
+          <a:xfrm>
+            <a:off x="2693252" y="1727726"/>
+            <a:ext cx="811921" cy="153888"/>
+          </a:xfrm>
+          <a:prstGeom prst="rect">
+            <a:avLst/>
+          </a:prstGeom>
+          <a:noFill/>
+        </p:spPr>
+        <p:txBody>
+          <a:bodyPr wrap="square" lIns="0" tIns="0" rIns="0" bIns="0" rtlCol="0">
+            <a:spAutoFit/>
+          </a:bodyPr>
+          <a:lstStyle>
+            <a:defPPr>
+              <a:defRPr lang="en-US"/>
+            </a:defPPr>
+            <a:lvl1pPr algn="r">
+              <a:defRPr sz="1400">
+                <a:solidFill>
+                  <a:srgbClr val="0070C0"/>
+                </a:solidFill>
+              </a:defRPr>
+            </a:lvl1pPr>
+          </a:lstStyle>
+          <a:p>
+            <a:r>
+              <a:rPr lang="en-US" sz="1000" dirty="0"/>
+              <a:t>parse(“1 r/</a:t>
+            </a:r>
+            <a:r>
+              <a:rPr lang="en-US" sz="1000" dirty="0" err="1"/>
+              <a:t>jkf</a:t>
+            </a:r>
+            <a:r>
+              <a:rPr lang="en-US" sz="1000" dirty="0"/>
+              <a:t>”)</a:t>
+            </a:r>
+          </a:p>
+        </p:txBody>
+      </p:sp>
+      <p:cxnSp>
+        <p:nvCxnSpPr>
+          <p:cNvPr id="92" name="Straight Arrow Connector 91">
+            <a:extLst>
+              <a:ext uri="{FF2B5EF4-FFF2-40B4-BE49-F238E27FC236}">
+                <a16:creationId xmlns:a16="http://schemas.microsoft.com/office/drawing/2014/main" id="{912CD2AB-2A72-4C41-A1F8-09C2E24C1510}"/>
+              </a:ext>
+            </a:extLst>
+          </p:cNvPr>
+          <p:cNvCxnSpPr>
+            <a:cxnSpLocks/>
+            <a:endCxn id="88" idx="0"/>
+          </p:cNvCxnSpPr>
+          <p:nvPr/>
+        </p:nvCxnSpPr>
+        <p:spPr>
+          <a:xfrm flipV="1">
+            <a:off x="2654787" y="1738263"/>
+            <a:ext cx="979511" cy="3732"/>
+          </a:xfrm>
+          <a:prstGeom prst="straightConnector1">
+            <a:avLst/>
+          </a:prstGeom>
+          <a:ln w="19050">
+            <a:solidFill>
+              <a:srgbClr val="0070C0"/>
+            </a:solidFill>
+            <a:tailEnd type="arrow"/>
+          </a:ln>
+        </p:spPr>
+        <p:style>
+          <a:lnRef idx="1">
+            <a:schemeClr val="accent1"/>
+          </a:lnRef>
+          <a:fillRef idx="0">
+            <a:schemeClr val="accent1"/>
+          </a:fillRef>
+          <a:effectRef idx="0">
+            <a:schemeClr val="accent1"/>
+          </a:effectRef>
+          <a:fontRef idx="minor">
+            <a:schemeClr val="tx1"/>
+          </a:fontRef>
+        </p:style>
+      </p:cxnSp>
+      <p:cxnSp>
+        <p:nvCxnSpPr>
+          <p:cNvPr id="100" name="Straight Arrow Connector 99">
+            <a:extLst>
+              <a:ext uri="{FF2B5EF4-FFF2-40B4-BE49-F238E27FC236}">
+                <a16:creationId xmlns:a16="http://schemas.microsoft.com/office/drawing/2014/main" id="{58FA2EB7-6892-634D-ADBD-7449F89712C9}"/>
+              </a:ext>
+            </a:extLst>
+          </p:cNvPr>
+          <p:cNvCxnSpPr>
+            <a:cxnSpLocks/>
+          </p:cNvCxnSpPr>
+          <p:nvPr/>
+        </p:nvCxnSpPr>
+        <p:spPr>
+          <a:xfrm>
+            <a:off x="1849713" y="2675173"/>
+            <a:ext cx="3186617" cy="0"/>
+          </a:xfrm>
+          <a:prstGeom prst="straightConnector1">
+            <a:avLst/>
+          </a:prstGeom>
+          <a:ln w="19050">
+            <a:solidFill>
+              <a:srgbClr val="0070C0"/>
+            </a:solidFill>
+            <a:prstDash val="sysDash"/>
+            <a:headEnd type="arrow" w="med" len="med"/>
+            <a:tailEnd type="none" w="med" len="med"/>
+          </a:ln>
+        </p:spPr>
+        <p:style>
+          <a:lnRef idx="1">
+            <a:schemeClr val="accent1"/>
+          </a:lnRef>
+          <a:fillRef idx="0">
+            <a:schemeClr val="accent1"/>
+          </a:fillRef>
+          <a:effectRef idx="0">
+            <a:schemeClr val="accent1"/>
+          </a:effectRef>
+          <a:fontRef idx="minor">
+            <a:schemeClr val="tx1"/>
+          </a:fontRef>
+        </p:style>
+      </p:cxnSp>
+      <p:sp>
+        <p:nvSpPr>
+          <p:cNvPr id="103" name="Rectangle 62">
+            <a:extLst>
+              <a:ext uri="{FF2B5EF4-FFF2-40B4-BE49-F238E27FC236}">
+                <a16:creationId xmlns:a16="http://schemas.microsoft.com/office/drawing/2014/main" id="{63BCA7A7-63C5-BF43-B5F9-95532BB2C970}"/>
+              </a:ext>
+            </a:extLst>
+          </p:cNvPr>
+          <p:cNvSpPr/>
+          <p:nvPr/>
+        </p:nvSpPr>
+        <p:spPr>
+          <a:xfrm>
+            <a:off x="4617662" y="1446958"/>
+            <a:ext cx="890204" cy="301398"/>
+          </a:xfrm>
+          <a:prstGeom prst="rect">
+            <a:avLst/>
+          </a:prstGeom>
+          <a:solidFill>
+            <a:srgbClr val="0070C0"/>
+          </a:solidFill>
+          <a:ln w="19050">
+            <a:solidFill>
+              <a:srgbClr val="0070C0"/>
+            </a:solidFill>
+          </a:ln>
+          <a:effectLst/>
+        </p:spPr>
+        <p:style>
+          <a:lnRef idx="1">
+            <a:schemeClr val="accent2"/>
+          </a:lnRef>
+          <a:fillRef idx="2">
+            <a:schemeClr val="accent2"/>
+          </a:fillRef>
+          <a:effectRef idx="1">
+            <a:schemeClr val="accent2"/>
+          </a:effectRef>
+          <a:fontRef idx="minor">
+            <a:schemeClr val="dk1"/>
+          </a:fontRef>
+        </p:style>
+        <p:txBody>
+          <a:bodyPr rtlCol="0" anchor="ctr"/>
+          <a:lstStyle/>
+          <a:p>
+            <a:pPr algn="ctr"/>
+            <a:r>
+              <a:rPr lang="en-US" sz="1200" dirty="0" err="1">
+                <a:solidFill>
+                  <a:schemeClr val="bg1"/>
+                </a:solidFill>
+              </a:rPr>
+              <a:t>r:Remark</a:t>
+            </a:r>
+            <a:br>
+              <a:rPr lang="en-US" sz="1200" dirty="0">
+                <a:solidFill>
+                  <a:schemeClr val="bg1"/>
+                </a:solidFill>
+              </a:rPr>
+            </a:br>
+            <a:r>
+              <a:rPr lang="en-US" sz="1200" dirty="0">
+                <a:solidFill>
+                  <a:schemeClr val="bg1"/>
+                </a:solidFill>
+              </a:rPr>
+              <a:t>Command</a:t>
+            </a:r>
+            <a:endParaRPr lang="en-SG" sz="1200" dirty="0">
+              <a:solidFill>
+                <a:schemeClr val="bg1"/>
+              </a:solidFill>
+            </a:endParaRPr>
+          </a:p>
+        </p:txBody>
+      </p:sp>
+      <p:cxnSp>
+        <p:nvCxnSpPr>
+          <p:cNvPr id="104" name="Straight Arrow Connector 103">
+            <a:extLst>
+              <a:ext uri="{FF2B5EF4-FFF2-40B4-BE49-F238E27FC236}">
+                <a16:creationId xmlns:a16="http://schemas.microsoft.com/office/drawing/2014/main" id="{3F76DF3E-8731-BC44-97F2-00BC1AF6FA8E}"/>
+              </a:ext>
+            </a:extLst>
+          </p:cNvPr>
+          <p:cNvCxnSpPr>
+            <a:cxnSpLocks/>
+          </p:cNvCxnSpPr>
+          <p:nvPr/>
+        </p:nvCxnSpPr>
+        <p:spPr>
+          <a:xfrm>
+            <a:off x="3700019" y="1745394"/>
+            <a:ext cx="917643" cy="2962"/>
+          </a:xfrm>
+          <a:prstGeom prst="straightConnector1">
+            <a:avLst/>
+          </a:prstGeom>
+          <a:ln w="19050">
+            <a:solidFill>
+              <a:srgbClr val="0070C0"/>
+            </a:solidFill>
+            <a:tailEnd type="arrow"/>
+          </a:ln>
+        </p:spPr>
+        <p:style>
+          <a:lnRef idx="1">
+            <a:schemeClr val="accent1"/>
+          </a:lnRef>
+          <a:fillRef idx="0">
+            <a:schemeClr val="accent1"/>
+          </a:fillRef>
+          <a:effectRef idx="0">
+            <a:schemeClr val="accent1"/>
+          </a:effectRef>
+          <a:fontRef idx="minor">
+            <a:schemeClr val="tx1"/>
+          </a:fontRef>
+        </p:style>
+      </p:cxnSp>
+      <p:cxnSp>
+        <p:nvCxnSpPr>
+          <p:cNvPr id="106" name="Straight Arrow Connector 105">
+            <a:extLst>
+              <a:ext uri="{FF2B5EF4-FFF2-40B4-BE49-F238E27FC236}">
+                <a16:creationId xmlns:a16="http://schemas.microsoft.com/office/drawing/2014/main" id="{CCA2CE31-03E6-6F48-A847-567272612CC3}"/>
+              </a:ext>
+            </a:extLst>
+          </p:cNvPr>
+          <p:cNvCxnSpPr>
+            <a:cxnSpLocks/>
+          </p:cNvCxnSpPr>
+          <p:nvPr/>
+        </p:nvCxnSpPr>
+        <p:spPr>
+          <a:xfrm>
+            <a:off x="3700019" y="1918743"/>
+            <a:ext cx="1336311" cy="7860"/>
+          </a:xfrm>
+          <a:prstGeom prst="straightConnector1">
+            <a:avLst/>
+          </a:prstGeom>
+          <a:ln w="19050">
+            <a:solidFill>
+              <a:srgbClr val="0070C0"/>
+            </a:solidFill>
+            <a:prstDash val="sysDash"/>
+            <a:headEnd type="arrow" w="med" len="med"/>
+            <a:tailEnd type="none" w="med" len="med"/>
+          </a:ln>
+        </p:spPr>
+        <p:style>
+          <a:lnRef idx="1">
+            <a:schemeClr val="accent1"/>
+          </a:lnRef>
+          <a:fillRef idx="0">
+            <a:schemeClr val="accent1"/>
+          </a:fillRef>
+          <a:effectRef idx="0">
+            <a:schemeClr val="accent1"/>
+          </a:effectRef>
+          <a:fontRef idx="minor">
+            <a:schemeClr val="tx1"/>
+          </a:fontRef>
+        </p:style>
+      </p:cxnSp>
+      <p:cxnSp>
+        <p:nvCxnSpPr>
+          <p:cNvPr id="110" name="Straight Connector 109">
+            <a:extLst>
+              <a:ext uri="{FF2B5EF4-FFF2-40B4-BE49-F238E27FC236}">
+                <a16:creationId xmlns:a16="http://schemas.microsoft.com/office/drawing/2014/main" id="{58E31936-CCF5-2441-BBE0-ED7A11FCF1D5}"/>
+              </a:ext>
+            </a:extLst>
+          </p:cNvPr>
+          <p:cNvCxnSpPr>
+            <a:cxnSpLocks/>
+          </p:cNvCxnSpPr>
+          <p:nvPr/>
+        </p:nvCxnSpPr>
+        <p:spPr>
+          <a:xfrm>
+            <a:off x="5036330" y="1453602"/>
+            <a:ext cx="0" cy="1365798"/>
+          </a:xfrm>
+          <a:prstGeom prst="line">
+            <a:avLst/>
+          </a:prstGeom>
+          <a:ln w="19050">
+            <a:solidFill>
+              <a:srgbClr val="0070C0"/>
+            </a:solidFill>
+            <a:prstDash val="sysDash"/>
+          </a:ln>
+          <a:effectLst/>
+        </p:spPr>
+        <p:style>
+          <a:lnRef idx="1">
+            <a:schemeClr val="accent1"/>
+          </a:lnRef>
+          <a:fillRef idx="2">
+            <a:schemeClr val="accent1"/>
+          </a:fillRef>
+          <a:effectRef idx="1">
+            <a:schemeClr val="accent1"/>
+          </a:effectRef>
+          <a:fontRef idx="minor">
+            <a:schemeClr val="dk1"/>
+          </a:fontRef>
+        </p:style>
+      </p:cxnSp>
+      <p:sp>
+        <p:nvSpPr>
+          <p:cNvPr id="113" name="Rectangle 112">
+            <a:extLst>
+              <a:ext uri="{FF2B5EF4-FFF2-40B4-BE49-F238E27FC236}">
+                <a16:creationId xmlns:a16="http://schemas.microsoft.com/office/drawing/2014/main" id="{A8DF0FD1-CEDB-8B4B-AB45-7957F5795040}"/>
+              </a:ext>
+            </a:extLst>
+          </p:cNvPr>
+          <p:cNvSpPr/>
+          <p:nvPr/>
+        </p:nvSpPr>
+        <p:spPr>
+          <a:xfrm>
+            <a:off x="4977621" y="2084078"/>
+            <a:ext cx="128925" cy="610577"/>
+          </a:xfrm>
+          <a:prstGeom prst="rect">
+            <a:avLst/>
+          </a:prstGeom>
+          <a:solidFill>
+            <a:srgbClr val="0070C0"/>
+          </a:solidFill>
+          <a:ln>
+            <a:solidFill>
+              <a:srgbClr val="0070C0"/>
+            </a:solidFill>
+          </a:ln>
+          <a:effectLst/>
+        </p:spPr>
+        <p:style>
+          <a:lnRef idx="1">
+            <a:schemeClr val="accent3"/>
+          </a:lnRef>
+          <a:fillRef idx="2">
+            <a:schemeClr val="accent3"/>
+          </a:fillRef>
+          <a:effectRef idx="1">
+            <a:schemeClr val="accent3"/>
+          </a:effectRef>
+          <a:fontRef idx="minor">
+            <a:schemeClr val="dk1"/>
+          </a:fontRef>
+        </p:style>
+        <p:txBody>
+          <a:bodyPr rtlCol="0" anchor="ctr"/>
+          <a:lstStyle/>
+          <a:p>
+            <a:pPr algn="ctr"/>
+            <a:endParaRPr lang="en-SG" sz="1400"/>
+          </a:p>
+        </p:txBody>
+      </p:sp>
+      <p:sp>
+        <p:nvSpPr>
+          <p:cNvPr id="115" name="Rectangle 62">
+            <a:extLst>
+              <a:ext uri="{FF2B5EF4-FFF2-40B4-BE49-F238E27FC236}">
+                <a16:creationId xmlns:a16="http://schemas.microsoft.com/office/drawing/2014/main" id="{B9476683-DB92-164E-A8E7-4AB2A5BACB18}"/>
+              </a:ext>
+            </a:extLst>
+          </p:cNvPr>
+          <p:cNvSpPr/>
+          <p:nvPr/>
+        </p:nvSpPr>
+        <p:spPr>
+          <a:xfrm>
+            <a:off x="5183440" y="2231260"/>
+            <a:ext cx="1342234" cy="286438"/>
+          </a:xfrm>
+          <a:prstGeom prst="rect">
+            <a:avLst/>
+          </a:prstGeom>
+          <a:solidFill>
+            <a:srgbClr val="0070C0"/>
+          </a:solidFill>
+          <a:ln w="19050">
+            <a:solidFill>
+              <a:srgbClr val="0070C0"/>
+            </a:solidFill>
+          </a:ln>
+          <a:effectLst/>
+        </p:spPr>
+        <p:style>
+          <a:lnRef idx="1">
+            <a:schemeClr val="accent2"/>
+          </a:lnRef>
+          <a:fillRef idx="2">
+            <a:schemeClr val="accent2"/>
+          </a:fillRef>
+          <a:effectRef idx="1">
+            <a:schemeClr val="accent2"/>
+          </a:effectRef>
+          <a:fontRef idx="minor">
+            <a:schemeClr val="dk1"/>
+          </a:fontRef>
+        </p:style>
+        <p:txBody>
+          <a:bodyPr rtlCol="0" anchor="ctr"/>
+          <a:lstStyle/>
+          <a:p>
+            <a:pPr algn="ctr"/>
+            <a:r>
+              <a:rPr lang="en-US" sz="1100" dirty="0" err="1">
+                <a:solidFill>
+                  <a:schemeClr val="bg1"/>
+                </a:solidFill>
+              </a:rPr>
+              <a:t>result:Command</a:t>
+            </a:r>
+            <a:r>
+              <a:rPr lang="en-US" sz="1100" dirty="0">
+                <a:solidFill>
+                  <a:schemeClr val="bg1"/>
+                </a:solidFill>
+              </a:rPr>
+              <a:t> Result</a:t>
+            </a:r>
+            <a:endParaRPr lang="en-SG" sz="1100" dirty="0">
+              <a:solidFill>
+                <a:schemeClr val="bg1"/>
+              </a:solidFill>
+            </a:endParaRPr>
+          </a:p>
+        </p:txBody>
+      </p:sp>
+      <p:cxnSp>
+        <p:nvCxnSpPr>
+          <p:cNvPr id="117" name="Straight Arrow Connector 116">
+            <a:extLst>
+              <a:ext uri="{FF2B5EF4-FFF2-40B4-BE49-F238E27FC236}">
+                <a16:creationId xmlns:a16="http://schemas.microsoft.com/office/drawing/2014/main" id="{256A4E76-0C60-AE4F-B8CA-F6ED06839885}"/>
+              </a:ext>
+            </a:extLst>
+          </p:cNvPr>
+          <p:cNvCxnSpPr>
+            <a:cxnSpLocks/>
+          </p:cNvCxnSpPr>
+          <p:nvPr/>
+        </p:nvCxnSpPr>
+        <p:spPr>
+          <a:xfrm flipV="1">
+            <a:off x="5110619" y="2368832"/>
+            <a:ext cx="135869" cy="328"/>
+          </a:xfrm>
+          <a:prstGeom prst="straightConnector1">
+            <a:avLst/>
+          </a:prstGeom>
+          <a:ln w="19050">
+            <a:solidFill>
+              <a:srgbClr val="0070C0"/>
+            </a:solidFill>
+            <a:tailEnd type="arrow"/>
+          </a:ln>
+        </p:spPr>
+        <p:style>
+          <a:lnRef idx="1">
+            <a:schemeClr val="accent1"/>
+          </a:lnRef>
+          <a:fillRef idx="0">
+            <a:schemeClr val="accent1"/>
+          </a:fillRef>
+          <a:effectRef idx="0">
+            <a:schemeClr val="accent1"/>
+          </a:effectRef>
+          <a:fontRef idx="minor">
+            <a:schemeClr val="tx1"/>
+          </a:fontRef>
+        </p:style>
+      </p:cxnSp>
+      <p:sp>
+        <p:nvSpPr>
+          <p:cNvPr id="120" name="Rectangle 119">
+            <a:extLst>
+              <a:ext uri="{FF2B5EF4-FFF2-40B4-BE49-F238E27FC236}">
+                <a16:creationId xmlns:a16="http://schemas.microsoft.com/office/drawing/2014/main" id="{8C1955C7-5B51-ED46-B953-F3478BFD7C9D}"/>
+              </a:ext>
+            </a:extLst>
+          </p:cNvPr>
+          <p:cNvSpPr/>
+          <p:nvPr/>
+        </p:nvSpPr>
+        <p:spPr>
+          <a:xfrm>
+            <a:off x="5786395" y="2501330"/>
+            <a:ext cx="152400" cy="171376"/>
+          </a:xfrm>
+          <a:prstGeom prst="rect">
+            <a:avLst/>
+          </a:prstGeom>
+          <a:solidFill>
+            <a:srgbClr val="0070C0"/>
+          </a:solidFill>
+          <a:ln>
+            <a:solidFill>
+              <a:srgbClr val="0070C0"/>
+            </a:solidFill>
+          </a:ln>
+          <a:effectLst/>
+        </p:spPr>
+        <p:style>
+          <a:lnRef idx="1">
+            <a:schemeClr val="accent3"/>
+          </a:lnRef>
+          <a:fillRef idx="2">
+            <a:schemeClr val="accent3"/>
+          </a:fillRef>
+          <a:effectRef idx="1">
+            <a:schemeClr val="accent3"/>
+          </a:effectRef>
+          <a:fontRef idx="minor">
+            <a:schemeClr val="dk1"/>
+          </a:fontRef>
+        </p:style>
+        <p:txBody>
+          <a:bodyPr rtlCol="0" anchor="ctr"/>
+          <a:lstStyle/>
+          <a:p>
+            <a:pPr algn="ctr"/>
+            <a:endParaRPr lang="en-SG" sz="1400"/>
+          </a:p>
+        </p:txBody>
+      </p:sp>
+      <p:cxnSp>
+        <p:nvCxnSpPr>
+          <p:cNvPr id="121" name="Straight Arrow Connector 120">
+            <a:extLst>
+              <a:ext uri="{FF2B5EF4-FFF2-40B4-BE49-F238E27FC236}">
+                <a16:creationId xmlns:a16="http://schemas.microsoft.com/office/drawing/2014/main" id="{A4244577-372F-A24D-9483-1C0E2CA8D86D}"/>
+              </a:ext>
+            </a:extLst>
+          </p:cNvPr>
+          <p:cNvCxnSpPr>
+            <a:cxnSpLocks/>
+          </p:cNvCxnSpPr>
+          <p:nvPr/>
+        </p:nvCxnSpPr>
+        <p:spPr>
+          <a:xfrm flipV="1">
+            <a:off x="5098595" y="2668186"/>
+            <a:ext cx="668156" cy="6987"/>
+          </a:xfrm>
+          <a:prstGeom prst="straightConnector1">
+            <a:avLst/>
+          </a:prstGeom>
+          <a:ln w="19050">
+            <a:solidFill>
+              <a:srgbClr val="0070C0"/>
+            </a:solidFill>
+            <a:prstDash val="sysDash"/>
+            <a:headEnd type="arrow" w="med" len="med"/>
+            <a:tailEnd type="none" w="med" len="med"/>
+          </a:ln>
+        </p:spPr>
+        <p:style>
+          <a:lnRef idx="1">
+            <a:schemeClr val="accent1"/>
+          </a:lnRef>
+          <a:fillRef idx="0">
+            <a:schemeClr val="accent1"/>
+          </a:fillRef>
+          <a:effectRef idx="0">
+            <a:schemeClr val="accent1"/>
+          </a:effectRef>
+          <a:fontRef idx="minor">
+            <a:schemeClr val="tx1"/>
+          </a:fontRef>
+        </p:style>
+      </p:cxnSp>
+      <p:cxnSp>
+        <p:nvCxnSpPr>
+          <p:cNvPr id="127" name="Straight Arrow Connector 126">
+            <a:extLst>
+              <a:ext uri="{FF2B5EF4-FFF2-40B4-BE49-F238E27FC236}">
+                <a16:creationId xmlns:a16="http://schemas.microsoft.com/office/drawing/2014/main" id="{B2339AF0-3AA5-B443-BA29-5C9D5EE2C1D1}"/>
+              </a:ext>
+            </a:extLst>
+          </p:cNvPr>
+          <p:cNvCxnSpPr>
+            <a:cxnSpLocks/>
+          </p:cNvCxnSpPr>
+          <p:nvPr/>
+        </p:nvCxnSpPr>
+        <p:spPr>
+          <a:xfrm flipV="1">
+            <a:off x="5110619" y="2089374"/>
+            <a:ext cx="690942" cy="6851"/>
+          </a:xfrm>
+          <a:prstGeom prst="straightConnector1">
+            <a:avLst/>
+          </a:prstGeom>
+          <a:ln w="19050">
+            <a:solidFill>
+              <a:srgbClr val="0070C0"/>
+            </a:solidFill>
+            <a:tailEnd type="arrow"/>
+          </a:ln>
+        </p:spPr>
+        <p:style>
+          <a:lnRef idx="1">
+            <a:schemeClr val="accent1"/>
+          </a:lnRef>
+          <a:fillRef idx="0">
+            <a:schemeClr val="accent1"/>
+          </a:fillRef>
+          <a:effectRef idx="0">
+            <a:schemeClr val="accent1"/>
+          </a:effectRef>
+          <a:fontRef idx="minor">
+            <a:schemeClr val="tx1"/>
+          </a:fontRef>
+        </p:style>
+      </p:cxnSp>
+      <p:sp>
+        <p:nvSpPr>
+          <p:cNvPr id="131" name="TextBox 130">
+            <a:extLst>
+              <a:ext uri="{FF2B5EF4-FFF2-40B4-BE49-F238E27FC236}">
+                <a16:creationId xmlns:a16="http://schemas.microsoft.com/office/drawing/2014/main" id="{0689F545-37B7-AE4B-9531-FD63BC24BA2F}"/>
+              </a:ext>
+            </a:extLst>
+          </p:cNvPr>
+          <p:cNvSpPr txBox="1"/>
+          <p:nvPr/>
+        </p:nvSpPr>
+        <p:spPr>
+          <a:xfrm>
+            <a:off x="3114601" y="2140099"/>
+            <a:ext cx="855809" cy="215444"/>
+          </a:xfrm>
+          <a:prstGeom prst="rect">
+            <a:avLst/>
+          </a:prstGeom>
+          <a:noFill/>
+        </p:spPr>
+        <p:txBody>
+          <a:bodyPr wrap="square" lIns="0" tIns="0" rIns="0" bIns="0" rtlCol="0">
+            <a:spAutoFit/>
+          </a:bodyPr>
+          <a:lstStyle>
+            <a:defPPr>
+              <a:defRPr lang="en-US"/>
+            </a:defPPr>
+            <a:lvl1pPr algn="r">
+              <a:defRPr sz="1400">
+                <a:solidFill>
+                  <a:srgbClr val="0070C0"/>
+                </a:solidFill>
+              </a:defRPr>
+            </a:lvl1pPr>
+          </a:lstStyle>
+          <a:p>
+            <a:r>
+              <a:rPr lang="en-US" dirty="0"/>
+              <a:t>execute()</a:t>
+            </a:r>
+          </a:p>
+        </p:txBody>
+      </p:sp>
+      <p:sp>
+        <p:nvSpPr>
+          <p:cNvPr id="132" name="TextBox 131">
+            <a:extLst>
+              <a:ext uri="{FF2B5EF4-FFF2-40B4-BE49-F238E27FC236}">
+                <a16:creationId xmlns:a16="http://schemas.microsoft.com/office/drawing/2014/main" id="{E722183E-2ED4-C942-A3BA-5FBB5C343CE3}"/>
+              </a:ext>
+            </a:extLst>
+          </p:cNvPr>
+          <p:cNvSpPr txBox="1"/>
+          <p:nvPr/>
+        </p:nvSpPr>
+        <p:spPr>
+          <a:xfrm>
+            <a:off x="3132413" y="2447837"/>
+            <a:ext cx="621216" cy="215444"/>
+          </a:xfrm>
+          <a:prstGeom prst="rect">
+            <a:avLst/>
+          </a:prstGeom>
+          <a:noFill/>
+        </p:spPr>
+        <p:txBody>
+          <a:bodyPr wrap="square" lIns="0" tIns="0" rIns="0" bIns="0" rtlCol="0">
+            <a:spAutoFit/>
+          </a:bodyPr>
+          <a:lstStyle>
+            <a:defPPr>
+              <a:defRPr lang="en-US"/>
+            </a:defPPr>
+            <a:lvl1pPr algn="r">
+              <a:defRPr sz="1400">
+                <a:solidFill>
+                  <a:srgbClr val="0070C0"/>
+                </a:solidFill>
+              </a:defRPr>
+            </a:lvl1pPr>
+          </a:lstStyle>
+          <a:p>
+            <a:r>
+              <a:rPr lang="en-US" dirty="0"/>
+              <a:t>result</a:t>
+            </a:r>
           </a:p>
         </p:txBody>
       </p:sp>
     </p:spTree>
     <p:extLst>
       <p:ext uri="{BB962C8B-B14F-4D97-AF65-F5344CB8AC3E}">
-        <p14:creationId xmlns:p14="http://schemas.microsoft.com/office/powerpoint/2010/main" val="4023378879"/>
+        <p14:creationId xmlns:p14="http://schemas.microsoft.com/office/powerpoint/2010/main" val="3146084596"/>
       </p:ext>
     </p:extLst>
   </p:cSld>

</xml_diff>

<commit_message>
Update UserGuide, DeveloperGuide and Project Portfolio
</commit_message>
<xml_diff>
--- a/docs/diagrams/HighLevelSequenceDiagrams.pptx
+++ b/docs/diagrams/HighLevelSequenceDiagrams.pptx
@@ -208,7 +208,7 @@
           <a:p>
             <a:fld id="{F5CC4B3F-88C1-4FFA-B1B6-F41C21DC6924}" type="datetimeFigureOut">
               <a:rPr lang="en-US" smtClean="0"/>
-              <a:t>10/31/18</a:t>
+              <a:t>11/11/2018</a:t>
             </a:fld>
             <a:endParaRPr lang="en-US"/>
           </a:p>
@@ -654,7 +654,7 @@
           <a:p>
             <a:fld id="{78C97017-6FC3-485B-9764-EAC9E56C1D49}" type="datetimeFigureOut">
               <a:rPr lang="en-US" smtClean="0"/>
-              <a:t>10/31/18</a:t>
+              <a:t>11/11/2018</a:t>
             </a:fld>
             <a:endParaRPr lang="en-US"/>
           </a:p>
@@ -822,7 +822,7 @@
           <a:p>
             <a:fld id="{78C97017-6FC3-485B-9764-EAC9E56C1D49}" type="datetimeFigureOut">
               <a:rPr lang="en-US" smtClean="0"/>
-              <a:t>10/31/18</a:t>
+              <a:t>11/11/2018</a:t>
             </a:fld>
             <a:endParaRPr lang="en-US"/>
           </a:p>
@@ -1000,7 +1000,7 @@
           <a:p>
             <a:fld id="{78C97017-6FC3-485B-9764-EAC9E56C1D49}" type="datetimeFigureOut">
               <a:rPr lang="en-US" smtClean="0"/>
-              <a:t>10/31/18</a:t>
+              <a:t>11/11/2018</a:t>
             </a:fld>
             <a:endParaRPr lang="en-US"/>
           </a:p>
@@ -1168,7 +1168,7 @@
           <a:p>
             <a:fld id="{78C97017-6FC3-485B-9764-EAC9E56C1D49}" type="datetimeFigureOut">
               <a:rPr lang="en-US" smtClean="0"/>
-              <a:t>10/31/18</a:t>
+              <a:t>11/11/2018</a:t>
             </a:fld>
             <a:endParaRPr lang="en-US"/>
           </a:p>
@@ -1413,7 +1413,7 @@
           <a:p>
             <a:fld id="{78C97017-6FC3-485B-9764-EAC9E56C1D49}" type="datetimeFigureOut">
               <a:rPr lang="en-US" smtClean="0"/>
-              <a:t>10/31/18</a:t>
+              <a:t>11/11/2018</a:t>
             </a:fld>
             <a:endParaRPr lang="en-US"/>
           </a:p>
@@ -1698,7 +1698,7 @@
           <a:p>
             <a:fld id="{78C97017-6FC3-485B-9764-EAC9E56C1D49}" type="datetimeFigureOut">
               <a:rPr lang="en-US" smtClean="0"/>
-              <a:t>10/31/18</a:t>
+              <a:t>11/11/2018</a:t>
             </a:fld>
             <a:endParaRPr lang="en-US"/>
           </a:p>
@@ -2117,7 +2117,7 @@
           <a:p>
             <a:fld id="{78C97017-6FC3-485B-9764-EAC9E56C1D49}" type="datetimeFigureOut">
               <a:rPr lang="en-US" smtClean="0"/>
-              <a:t>10/31/18</a:t>
+              <a:t>11/11/2018</a:t>
             </a:fld>
             <a:endParaRPr lang="en-US"/>
           </a:p>
@@ -2234,7 +2234,7 @@
           <a:p>
             <a:fld id="{78C97017-6FC3-485B-9764-EAC9E56C1D49}" type="datetimeFigureOut">
               <a:rPr lang="en-US" smtClean="0"/>
-              <a:t>10/31/18</a:t>
+              <a:t>11/11/2018</a:t>
             </a:fld>
             <a:endParaRPr lang="en-US"/>
           </a:p>
@@ -2329,7 +2329,7 @@
           <a:p>
             <a:fld id="{78C97017-6FC3-485B-9764-EAC9E56C1D49}" type="datetimeFigureOut">
               <a:rPr lang="en-US" smtClean="0"/>
-              <a:t>10/31/18</a:t>
+              <a:t>11/11/2018</a:t>
             </a:fld>
             <a:endParaRPr lang="en-US"/>
           </a:p>
@@ -2604,7 +2604,7 @@
           <a:p>
             <a:fld id="{78C97017-6FC3-485B-9764-EAC9E56C1D49}" type="datetimeFigureOut">
               <a:rPr lang="en-US" smtClean="0"/>
-              <a:t>10/31/18</a:t>
+              <a:t>11/11/2018</a:t>
             </a:fld>
             <a:endParaRPr lang="en-US"/>
           </a:p>
@@ -2856,7 +2856,7 @@
           <a:p>
             <a:fld id="{78C97017-6FC3-485B-9764-EAC9E56C1D49}" type="datetimeFigureOut">
               <a:rPr lang="en-US" smtClean="0"/>
-              <a:t>10/31/18</a:t>
+              <a:t>11/11/2018</a:t>
             </a:fld>
             <a:endParaRPr lang="en-US"/>
           </a:p>
@@ -3067,7 +3067,7 @@
           <a:p>
             <a:fld id="{78C97017-6FC3-485B-9764-EAC9E56C1D49}" type="datetimeFigureOut">
               <a:rPr lang="en-US" smtClean="0"/>
-              <a:t>10/31/18</a:t>
+              <a:t>11/11/2018</a:t>
             </a:fld>
             <a:endParaRPr lang="en-US"/>
           </a:p>
@@ -4428,27 +4428,7 @@
                   </a:schemeClr>
                 </a:solidFill>
               </a:rPr>
-              <a:t>post(</a:t>
-            </a:r>
-            <a:r>
-              <a:rPr lang="en-US" sz="1400" dirty="0" err="1">
-                <a:solidFill>
-                  <a:schemeClr val="accent5">
-                    <a:lumMod val="75000"/>
-                  </a:schemeClr>
-                </a:solidFill>
-              </a:rPr>
-              <a:t>WorkoutBookChangedEvent</a:t>
-            </a:r>
-            <a:r>
-              <a:rPr lang="en-US" sz="1400" dirty="0">
-                <a:solidFill>
-                  <a:schemeClr val="accent5">
-                    <a:lumMod val="75000"/>
-                  </a:schemeClr>
-                </a:solidFill>
-              </a:rPr>
-              <a:t>)</a:t>
+              <a:t>post(WorkoutBookChangedEvent)</a:t>
             </a:r>
           </a:p>
         </p:txBody>
@@ -4626,15 +4606,7 @@
                   <a:schemeClr val="bg1"/>
                 </a:solidFill>
               </a:rPr>
-              <a:t>:</a:t>
-            </a:r>
-            <a:r>
-              <a:rPr lang="en-US" sz="1600" dirty="0" err="1">
-                <a:solidFill>
-                  <a:schemeClr val="bg1"/>
-                </a:solidFill>
-              </a:rPr>
-              <a:t>EventsCenter</a:t>
+              <a:t>:EventsCenter</a:t>
             </a:r>
             <a:endParaRPr lang="en-SG" sz="1600" dirty="0">
               <a:solidFill>
@@ -5001,27 +4973,7 @@
                   </a:schemeClr>
                 </a:solidFill>
               </a:rPr>
-              <a:t>post(</a:t>
-            </a:r>
-            <a:r>
-              <a:rPr lang="en-US" sz="1400" dirty="0" err="1">
-                <a:solidFill>
-                  <a:schemeClr val="accent5">
-                    <a:lumMod val="75000"/>
-                  </a:schemeClr>
-                </a:solidFill>
-              </a:rPr>
-              <a:t>WorkoutBookChangedEvent</a:t>
-            </a:r>
-            <a:r>
-              <a:rPr lang="en-US" sz="1400" dirty="0">
-                <a:solidFill>
-                  <a:schemeClr val="accent5">
-                    <a:lumMod val="75000"/>
-                  </a:schemeClr>
-                </a:solidFill>
-              </a:rPr>
-              <a:t>)</a:t>
+              <a:t>post(WorkoutBookChangedEvent)</a:t>
             </a:r>
           </a:p>
         </p:txBody>
@@ -5119,15 +5071,7 @@
                   <a:schemeClr val="bg1"/>
                 </a:solidFill>
               </a:rPr>
-              <a:t>:</a:t>
-            </a:r>
-            <a:r>
-              <a:rPr lang="en-US" sz="1600" dirty="0" err="1">
-                <a:solidFill>
-                  <a:schemeClr val="bg1"/>
-                </a:solidFill>
-              </a:rPr>
-              <a:t>EventsCenter</a:t>
+              <a:t>:EventsCenter</a:t>
             </a:r>
             <a:endParaRPr lang="en-SG" sz="1600" dirty="0">
               <a:solidFill>
@@ -5369,16 +5313,6 @@
           <a:lstStyle/>
           <a:p>
             <a:r>
-              <a:rPr lang="en-US" sz="1400" dirty="0" err="1">
-                <a:solidFill>
-                  <a:schemeClr val="accent6">
-                    <a:lumMod val="75000"/>
-                  </a:schemeClr>
-                </a:solidFill>
-              </a:rPr>
-              <a:t>handleWorkoutBookChangedEvent</a:t>
-            </a:r>
-            <a:r>
               <a:rPr lang="en-US" sz="1400" dirty="0">
                 <a:solidFill>
                   <a:schemeClr val="accent6">
@@ -5386,7 +5320,7 @@
                   </a:schemeClr>
                 </a:solidFill>
               </a:rPr>
-              <a:t>()</a:t>
+              <a:t>handleWorkoutBookChangedEvent()</a:t>
             </a:r>
           </a:p>
         </p:txBody>
@@ -5677,20 +5611,12 @@
           <a:lstStyle/>
           <a:p>
             <a:r>
-              <a:rPr lang="en-US" sz="1400" dirty="0" err="1">
-                <a:solidFill>
-                  <a:srgbClr val="00B050"/>
-                </a:solidFill>
-              </a:rPr>
-              <a:t>handleWorkoutBookChangedEvent</a:t>
-            </a:r>
-            <a:r>
               <a:rPr lang="en-US" sz="1400" dirty="0">
                 <a:solidFill>
                   <a:srgbClr val="00B050"/>
                 </a:solidFill>
               </a:rPr>
-              <a:t>()</a:t>
+              <a:t>handleWorkoutBookChangedEvent()</a:t>
             </a:r>
           </a:p>
         </p:txBody>

</xml_diff>